<commit_message>
through the first UI explanation
</commit_message>
<xml_diff>
--- a/images/images.pptx
+++ b/images/images.pptx
@@ -5,7 +5,7 @@
     <p:sldMasterId id="2147483648" r:id="rId1"/>
   </p:sldMasterIdLst>
   <p:notesMasterIdLst>
-    <p:notesMasterId r:id="rId12"/>
+    <p:notesMasterId r:id="rId16"/>
   </p:notesMasterIdLst>
   <p:sldIdLst>
     <p:sldId id="256" r:id="rId2"/>
@@ -17,7 +17,11 @@
     <p:sldId id="261" r:id="rId8"/>
     <p:sldId id="269" r:id="rId9"/>
     <p:sldId id="270" r:id="rId10"/>
-    <p:sldId id="271" r:id="rId11"/>
+    <p:sldId id="275" r:id="rId11"/>
+    <p:sldId id="278" r:id="rId12"/>
+    <p:sldId id="276" r:id="rId13"/>
+    <p:sldId id="277" r:id="rId14"/>
+    <p:sldId id="273" r:id="rId15"/>
   </p:sldIdLst>
   <p:sldSz cx="12192000" cy="6858000"/>
   <p:notesSz cx="6858000" cy="9144000"/>
@@ -565,7 +569,7 @@
         <p:cNvPr id="1" name="">
           <a:extLst>
             <a:ext uri="{FF2B5EF4-FFF2-40B4-BE49-F238E27FC236}">
-              <a16:creationId xmlns:a16="http://schemas.microsoft.com/office/drawing/2014/main" id="{662C242B-62A5-585F-32C3-C239EE7AA856}"/>
+              <a16:creationId xmlns:a16="http://schemas.microsoft.com/office/drawing/2014/main" id="{6F99D202-3B42-0520-EFE4-6015F8221A19}"/>
             </a:ext>
           </a:extLst>
         </p:cNvPr>
@@ -585,7 +589,7 @@
           <p:cNvPr id="2" name="Slide Image Placeholder 1">
             <a:extLst>
               <a:ext uri="{FF2B5EF4-FFF2-40B4-BE49-F238E27FC236}">
-                <a16:creationId xmlns:a16="http://schemas.microsoft.com/office/drawing/2014/main" id="{B77123F0-C030-F16F-DBEE-65B2D18A6DBC}"/>
+                <a16:creationId xmlns:a16="http://schemas.microsoft.com/office/drawing/2014/main" id="{0F9F0B2B-53FD-A809-DD52-F4994AA83E39}"/>
               </a:ext>
             </a:extLst>
           </p:cNvPr>
@@ -603,7 +607,7 @@
           <p:cNvPr id="3" name="Notes Placeholder 2">
             <a:extLst>
               <a:ext uri="{FF2B5EF4-FFF2-40B4-BE49-F238E27FC236}">
-                <a16:creationId xmlns:a16="http://schemas.microsoft.com/office/drawing/2014/main" id="{EF4B9859-FFE8-EB27-99B1-4BED796C06C6}"/>
+                <a16:creationId xmlns:a16="http://schemas.microsoft.com/office/drawing/2014/main" id="{CADE0E93-03F1-E62B-A1D9-A425EB4193D5}"/>
               </a:ext>
             </a:extLst>
           </p:cNvPr>
@@ -628,7 +632,7 @@
           <p:cNvPr id="4" name="Slide Number Placeholder 3">
             <a:extLst>
               <a:ext uri="{FF2B5EF4-FFF2-40B4-BE49-F238E27FC236}">
-                <a16:creationId xmlns:a16="http://schemas.microsoft.com/office/drawing/2014/main" id="{B8AA0F20-5186-7C4B-624B-F1B5B8A6E6AE}"/>
+                <a16:creationId xmlns:a16="http://schemas.microsoft.com/office/drawing/2014/main" id="{F22E6EDE-73A3-3AC5-1184-E43587973EAB}"/>
               </a:ext>
             </a:extLst>
           </p:cNvPr>
@@ -655,7 +659,439 @@
     </p:spTree>
     <p:extLst>
       <p:ext uri="{BB962C8B-B14F-4D97-AF65-F5344CB8AC3E}">
-        <p14:creationId xmlns:p14="http://schemas.microsoft.com/office/powerpoint/2010/main" val="4129836771"/>
+        <p14:creationId xmlns:p14="http://schemas.microsoft.com/office/powerpoint/2010/main" val="871147315"/>
+      </p:ext>
+    </p:extLst>
+  </p:cSld>
+  <p:clrMapOvr>
+    <a:masterClrMapping/>
+  </p:clrMapOvr>
+</p:notes>
+</file>
+
+<file path=ppt/notesSlides/notesSlide11.xml><?xml version="1.0" encoding="utf-8"?>
+<p:notes xmlns:a="http://schemas.openxmlformats.org/drawingml/2006/main" xmlns:r="http://schemas.openxmlformats.org/officeDocument/2006/relationships" xmlns:p="http://schemas.openxmlformats.org/presentationml/2006/main">
+  <p:cSld>
+    <p:spTree>
+      <p:nvGrpSpPr>
+        <p:cNvPr id="1" name="">
+          <a:extLst>
+            <a:ext uri="{FF2B5EF4-FFF2-40B4-BE49-F238E27FC236}">
+              <a16:creationId xmlns:a16="http://schemas.microsoft.com/office/drawing/2014/main" id="{A2FFA2E4-3B39-EF36-F6B3-8877F72CE2B0}"/>
+            </a:ext>
+          </a:extLst>
+        </p:cNvPr>
+        <p:cNvGrpSpPr/>
+        <p:nvPr/>
+      </p:nvGrpSpPr>
+      <p:grpSpPr>
+        <a:xfrm>
+          <a:off x="0" y="0"/>
+          <a:ext cx="0" cy="0"/>
+          <a:chOff x="0" y="0"/>
+          <a:chExt cx="0" cy="0"/>
+        </a:xfrm>
+      </p:grpSpPr>
+      <p:sp>
+        <p:nvSpPr>
+          <p:cNvPr id="2" name="Slide Image Placeholder 1">
+            <a:extLst>
+              <a:ext uri="{FF2B5EF4-FFF2-40B4-BE49-F238E27FC236}">
+                <a16:creationId xmlns:a16="http://schemas.microsoft.com/office/drawing/2014/main" id="{F9732F7E-F0FC-A9DC-7363-B82FB96703A0}"/>
+              </a:ext>
+            </a:extLst>
+          </p:cNvPr>
+          <p:cNvSpPr>
+            <a:spLocks noGrp="1" noRot="1" noChangeAspect="1"/>
+          </p:cNvSpPr>
+          <p:nvPr>
+            <p:ph type="sldImg"/>
+          </p:nvPr>
+        </p:nvSpPr>
+        <p:spPr/>
+      </p:sp>
+      <p:sp>
+        <p:nvSpPr>
+          <p:cNvPr id="3" name="Notes Placeholder 2">
+            <a:extLst>
+              <a:ext uri="{FF2B5EF4-FFF2-40B4-BE49-F238E27FC236}">
+                <a16:creationId xmlns:a16="http://schemas.microsoft.com/office/drawing/2014/main" id="{51DA9964-4C1F-D75A-D162-844E90E5AB56}"/>
+              </a:ext>
+            </a:extLst>
+          </p:cNvPr>
+          <p:cNvSpPr>
+            <a:spLocks noGrp="1"/>
+          </p:cNvSpPr>
+          <p:nvPr>
+            <p:ph type="body" idx="1"/>
+          </p:nvPr>
+        </p:nvSpPr>
+        <p:spPr/>
+        <p:txBody>
+          <a:bodyPr/>
+          <a:lstStyle/>
+          <a:p>
+            <a:endParaRPr lang="en-US" dirty="0"/>
+          </a:p>
+        </p:txBody>
+      </p:sp>
+      <p:sp>
+        <p:nvSpPr>
+          <p:cNvPr id="4" name="Slide Number Placeholder 3">
+            <a:extLst>
+              <a:ext uri="{FF2B5EF4-FFF2-40B4-BE49-F238E27FC236}">
+                <a16:creationId xmlns:a16="http://schemas.microsoft.com/office/drawing/2014/main" id="{D0E052A0-E728-1F2B-A028-91D6E83EB400}"/>
+              </a:ext>
+            </a:extLst>
+          </p:cNvPr>
+          <p:cNvSpPr>
+            <a:spLocks noGrp="1"/>
+          </p:cNvSpPr>
+          <p:nvPr>
+            <p:ph type="sldNum" sz="quarter" idx="5"/>
+          </p:nvPr>
+        </p:nvSpPr>
+        <p:spPr/>
+        <p:txBody>
+          <a:bodyPr/>
+          <a:lstStyle/>
+          <a:p>
+            <a:fld id="{A59EC0A6-2850-D147-9A65-4202BC918C7F}" type="slidenum">
+              <a:rPr lang="en-US" smtClean="0"/>
+              <a:t>11</a:t>
+            </a:fld>
+            <a:endParaRPr lang="en-US"/>
+          </a:p>
+        </p:txBody>
+      </p:sp>
+    </p:spTree>
+    <p:extLst>
+      <p:ext uri="{BB962C8B-B14F-4D97-AF65-F5344CB8AC3E}">
+        <p14:creationId xmlns:p14="http://schemas.microsoft.com/office/powerpoint/2010/main" val="3632648678"/>
+      </p:ext>
+    </p:extLst>
+  </p:cSld>
+  <p:clrMapOvr>
+    <a:masterClrMapping/>
+  </p:clrMapOvr>
+</p:notes>
+</file>
+
+<file path=ppt/notesSlides/notesSlide12.xml><?xml version="1.0" encoding="utf-8"?>
+<p:notes xmlns:a="http://schemas.openxmlformats.org/drawingml/2006/main" xmlns:r="http://schemas.openxmlformats.org/officeDocument/2006/relationships" xmlns:p="http://schemas.openxmlformats.org/presentationml/2006/main">
+  <p:cSld>
+    <p:spTree>
+      <p:nvGrpSpPr>
+        <p:cNvPr id="1" name="">
+          <a:extLst>
+            <a:ext uri="{FF2B5EF4-FFF2-40B4-BE49-F238E27FC236}">
+              <a16:creationId xmlns:a16="http://schemas.microsoft.com/office/drawing/2014/main" id="{DCBA106E-3FBE-2746-55A6-1160AA7E0F9A}"/>
+            </a:ext>
+          </a:extLst>
+        </p:cNvPr>
+        <p:cNvGrpSpPr/>
+        <p:nvPr/>
+      </p:nvGrpSpPr>
+      <p:grpSpPr>
+        <a:xfrm>
+          <a:off x="0" y="0"/>
+          <a:ext cx="0" cy="0"/>
+          <a:chOff x="0" y="0"/>
+          <a:chExt cx="0" cy="0"/>
+        </a:xfrm>
+      </p:grpSpPr>
+      <p:sp>
+        <p:nvSpPr>
+          <p:cNvPr id="2" name="Slide Image Placeholder 1">
+            <a:extLst>
+              <a:ext uri="{FF2B5EF4-FFF2-40B4-BE49-F238E27FC236}">
+                <a16:creationId xmlns:a16="http://schemas.microsoft.com/office/drawing/2014/main" id="{9ADD41D1-B0D6-01BC-5939-BEC4F0C1AD76}"/>
+              </a:ext>
+            </a:extLst>
+          </p:cNvPr>
+          <p:cNvSpPr>
+            <a:spLocks noGrp="1" noRot="1" noChangeAspect="1"/>
+          </p:cNvSpPr>
+          <p:nvPr>
+            <p:ph type="sldImg"/>
+          </p:nvPr>
+        </p:nvSpPr>
+        <p:spPr/>
+      </p:sp>
+      <p:sp>
+        <p:nvSpPr>
+          <p:cNvPr id="3" name="Notes Placeholder 2">
+            <a:extLst>
+              <a:ext uri="{FF2B5EF4-FFF2-40B4-BE49-F238E27FC236}">
+                <a16:creationId xmlns:a16="http://schemas.microsoft.com/office/drawing/2014/main" id="{82D82BCA-39C4-B9DF-7749-574525FEF5BB}"/>
+              </a:ext>
+            </a:extLst>
+          </p:cNvPr>
+          <p:cNvSpPr>
+            <a:spLocks noGrp="1"/>
+          </p:cNvSpPr>
+          <p:nvPr>
+            <p:ph type="body" idx="1"/>
+          </p:nvPr>
+        </p:nvSpPr>
+        <p:spPr/>
+        <p:txBody>
+          <a:bodyPr/>
+          <a:lstStyle/>
+          <a:p>
+            <a:endParaRPr lang="en-US" dirty="0"/>
+          </a:p>
+        </p:txBody>
+      </p:sp>
+      <p:sp>
+        <p:nvSpPr>
+          <p:cNvPr id="4" name="Slide Number Placeholder 3">
+            <a:extLst>
+              <a:ext uri="{FF2B5EF4-FFF2-40B4-BE49-F238E27FC236}">
+                <a16:creationId xmlns:a16="http://schemas.microsoft.com/office/drawing/2014/main" id="{52F9B8E2-C6B3-DF62-D86E-4B095671EB9A}"/>
+              </a:ext>
+            </a:extLst>
+          </p:cNvPr>
+          <p:cNvSpPr>
+            <a:spLocks noGrp="1"/>
+          </p:cNvSpPr>
+          <p:nvPr>
+            <p:ph type="sldNum" sz="quarter" idx="5"/>
+          </p:nvPr>
+        </p:nvSpPr>
+        <p:spPr/>
+        <p:txBody>
+          <a:bodyPr/>
+          <a:lstStyle/>
+          <a:p>
+            <a:fld id="{A59EC0A6-2850-D147-9A65-4202BC918C7F}" type="slidenum">
+              <a:rPr lang="en-US" smtClean="0"/>
+              <a:t>12</a:t>
+            </a:fld>
+            <a:endParaRPr lang="en-US"/>
+          </a:p>
+        </p:txBody>
+      </p:sp>
+    </p:spTree>
+    <p:extLst>
+      <p:ext uri="{BB962C8B-B14F-4D97-AF65-F5344CB8AC3E}">
+        <p14:creationId xmlns:p14="http://schemas.microsoft.com/office/powerpoint/2010/main" val="2175441274"/>
+      </p:ext>
+    </p:extLst>
+  </p:cSld>
+  <p:clrMapOvr>
+    <a:masterClrMapping/>
+  </p:clrMapOvr>
+</p:notes>
+</file>
+
+<file path=ppt/notesSlides/notesSlide13.xml><?xml version="1.0" encoding="utf-8"?>
+<p:notes xmlns:a="http://schemas.openxmlformats.org/drawingml/2006/main" xmlns:r="http://schemas.openxmlformats.org/officeDocument/2006/relationships" xmlns:p="http://schemas.openxmlformats.org/presentationml/2006/main">
+  <p:cSld>
+    <p:spTree>
+      <p:nvGrpSpPr>
+        <p:cNvPr id="1" name="">
+          <a:extLst>
+            <a:ext uri="{FF2B5EF4-FFF2-40B4-BE49-F238E27FC236}">
+              <a16:creationId xmlns:a16="http://schemas.microsoft.com/office/drawing/2014/main" id="{28A6618E-D79A-CF07-C8D0-DC31DF38BCE3}"/>
+            </a:ext>
+          </a:extLst>
+        </p:cNvPr>
+        <p:cNvGrpSpPr/>
+        <p:nvPr/>
+      </p:nvGrpSpPr>
+      <p:grpSpPr>
+        <a:xfrm>
+          <a:off x="0" y="0"/>
+          <a:ext cx="0" cy="0"/>
+          <a:chOff x="0" y="0"/>
+          <a:chExt cx="0" cy="0"/>
+        </a:xfrm>
+      </p:grpSpPr>
+      <p:sp>
+        <p:nvSpPr>
+          <p:cNvPr id="2" name="Slide Image Placeholder 1">
+            <a:extLst>
+              <a:ext uri="{FF2B5EF4-FFF2-40B4-BE49-F238E27FC236}">
+                <a16:creationId xmlns:a16="http://schemas.microsoft.com/office/drawing/2014/main" id="{91DA63DF-99EB-86DA-A942-599DE8C42B68}"/>
+              </a:ext>
+            </a:extLst>
+          </p:cNvPr>
+          <p:cNvSpPr>
+            <a:spLocks noGrp="1" noRot="1" noChangeAspect="1"/>
+          </p:cNvSpPr>
+          <p:nvPr>
+            <p:ph type="sldImg"/>
+          </p:nvPr>
+        </p:nvSpPr>
+        <p:spPr/>
+      </p:sp>
+      <p:sp>
+        <p:nvSpPr>
+          <p:cNvPr id="3" name="Notes Placeholder 2">
+            <a:extLst>
+              <a:ext uri="{FF2B5EF4-FFF2-40B4-BE49-F238E27FC236}">
+                <a16:creationId xmlns:a16="http://schemas.microsoft.com/office/drawing/2014/main" id="{8060E808-2F99-3782-F62B-3DB34FE3E878}"/>
+              </a:ext>
+            </a:extLst>
+          </p:cNvPr>
+          <p:cNvSpPr>
+            <a:spLocks noGrp="1"/>
+          </p:cNvSpPr>
+          <p:nvPr>
+            <p:ph type="body" idx="1"/>
+          </p:nvPr>
+        </p:nvSpPr>
+        <p:spPr/>
+        <p:txBody>
+          <a:bodyPr/>
+          <a:lstStyle/>
+          <a:p>
+            <a:endParaRPr lang="en-US" dirty="0"/>
+          </a:p>
+        </p:txBody>
+      </p:sp>
+      <p:sp>
+        <p:nvSpPr>
+          <p:cNvPr id="4" name="Slide Number Placeholder 3">
+            <a:extLst>
+              <a:ext uri="{FF2B5EF4-FFF2-40B4-BE49-F238E27FC236}">
+                <a16:creationId xmlns:a16="http://schemas.microsoft.com/office/drawing/2014/main" id="{93CE0B5D-24A5-16F6-28C8-3EFD7C9CB082}"/>
+              </a:ext>
+            </a:extLst>
+          </p:cNvPr>
+          <p:cNvSpPr>
+            <a:spLocks noGrp="1"/>
+          </p:cNvSpPr>
+          <p:nvPr>
+            <p:ph type="sldNum" sz="quarter" idx="5"/>
+          </p:nvPr>
+        </p:nvSpPr>
+        <p:spPr/>
+        <p:txBody>
+          <a:bodyPr/>
+          <a:lstStyle/>
+          <a:p>
+            <a:fld id="{A59EC0A6-2850-D147-9A65-4202BC918C7F}" type="slidenum">
+              <a:rPr lang="en-US" smtClean="0"/>
+              <a:t>13</a:t>
+            </a:fld>
+            <a:endParaRPr lang="en-US"/>
+          </a:p>
+        </p:txBody>
+      </p:sp>
+    </p:spTree>
+    <p:extLst>
+      <p:ext uri="{BB962C8B-B14F-4D97-AF65-F5344CB8AC3E}">
+        <p14:creationId xmlns:p14="http://schemas.microsoft.com/office/powerpoint/2010/main" val="481812022"/>
+      </p:ext>
+    </p:extLst>
+  </p:cSld>
+  <p:clrMapOvr>
+    <a:masterClrMapping/>
+  </p:clrMapOvr>
+</p:notes>
+</file>
+
+<file path=ppt/notesSlides/notesSlide14.xml><?xml version="1.0" encoding="utf-8"?>
+<p:notes xmlns:a="http://schemas.openxmlformats.org/drawingml/2006/main" xmlns:r="http://schemas.openxmlformats.org/officeDocument/2006/relationships" xmlns:p="http://schemas.openxmlformats.org/presentationml/2006/main">
+  <p:cSld>
+    <p:spTree>
+      <p:nvGrpSpPr>
+        <p:cNvPr id="1" name="">
+          <a:extLst>
+            <a:ext uri="{FF2B5EF4-FFF2-40B4-BE49-F238E27FC236}">
+              <a16:creationId xmlns:a16="http://schemas.microsoft.com/office/drawing/2014/main" id="{9B48BD26-B1C5-7003-2418-BA04DEAC2A9A}"/>
+            </a:ext>
+          </a:extLst>
+        </p:cNvPr>
+        <p:cNvGrpSpPr/>
+        <p:nvPr/>
+      </p:nvGrpSpPr>
+      <p:grpSpPr>
+        <a:xfrm>
+          <a:off x="0" y="0"/>
+          <a:ext cx="0" cy="0"/>
+          <a:chOff x="0" y="0"/>
+          <a:chExt cx="0" cy="0"/>
+        </a:xfrm>
+      </p:grpSpPr>
+      <p:sp>
+        <p:nvSpPr>
+          <p:cNvPr id="2" name="Slide Image Placeholder 1">
+            <a:extLst>
+              <a:ext uri="{FF2B5EF4-FFF2-40B4-BE49-F238E27FC236}">
+                <a16:creationId xmlns:a16="http://schemas.microsoft.com/office/drawing/2014/main" id="{B8840E17-4F8F-13C4-F4FB-F879048BCFC5}"/>
+              </a:ext>
+            </a:extLst>
+          </p:cNvPr>
+          <p:cNvSpPr>
+            <a:spLocks noGrp="1" noRot="1" noChangeAspect="1"/>
+          </p:cNvSpPr>
+          <p:nvPr>
+            <p:ph type="sldImg"/>
+          </p:nvPr>
+        </p:nvSpPr>
+        <p:spPr/>
+      </p:sp>
+      <p:sp>
+        <p:nvSpPr>
+          <p:cNvPr id="3" name="Notes Placeholder 2">
+            <a:extLst>
+              <a:ext uri="{FF2B5EF4-FFF2-40B4-BE49-F238E27FC236}">
+                <a16:creationId xmlns:a16="http://schemas.microsoft.com/office/drawing/2014/main" id="{59B77F58-81A2-5B40-ED2B-1104609E406E}"/>
+              </a:ext>
+            </a:extLst>
+          </p:cNvPr>
+          <p:cNvSpPr>
+            <a:spLocks noGrp="1"/>
+          </p:cNvSpPr>
+          <p:nvPr>
+            <p:ph type="body" idx="1"/>
+          </p:nvPr>
+        </p:nvSpPr>
+        <p:spPr/>
+        <p:txBody>
+          <a:bodyPr/>
+          <a:lstStyle/>
+          <a:p>
+            <a:endParaRPr lang="en-US" dirty="0"/>
+          </a:p>
+        </p:txBody>
+      </p:sp>
+      <p:sp>
+        <p:nvSpPr>
+          <p:cNvPr id="4" name="Slide Number Placeholder 3">
+            <a:extLst>
+              <a:ext uri="{FF2B5EF4-FFF2-40B4-BE49-F238E27FC236}">
+                <a16:creationId xmlns:a16="http://schemas.microsoft.com/office/drawing/2014/main" id="{180D8FC8-C259-3921-65A6-081C664086A6}"/>
+              </a:ext>
+            </a:extLst>
+          </p:cNvPr>
+          <p:cNvSpPr>
+            <a:spLocks noGrp="1"/>
+          </p:cNvSpPr>
+          <p:nvPr>
+            <p:ph type="sldNum" sz="quarter" idx="5"/>
+          </p:nvPr>
+        </p:nvSpPr>
+        <p:spPr/>
+        <p:txBody>
+          <a:bodyPr/>
+          <a:lstStyle/>
+          <a:p>
+            <a:fld id="{A59EC0A6-2850-D147-9A65-4202BC918C7F}" type="slidenum">
+              <a:rPr lang="en-US" smtClean="0"/>
+              <a:t>14</a:t>
+            </a:fld>
+            <a:endParaRPr lang="en-US"/>
+          </a:p>
+        </p:txBody>
+      </p:sp>
+    </p:spTree>
+    <p:extLst>
+      <p:ext uri="{BB962C8B-B14F-4D97-AF65-F5344CB8AC3E}">
+        <p14:creationId xmlns:p14="http://schemas.microsoft.com/office/powerpoint/2010/main" val="1597887606"/>
       </p:ext>
     </p:extLst>
   </p:cSld>
@@ -4797,12 +5233,20 @@
 <file path=ppt/slides/slide10.xml><?xml version="1.0" encoding="utf-8"?>
 <p:sld xmlns:a="http://schemas.openxmlformats.org/drawingml/2006/main" xmlns:r="http://schemas.openxmlformats.org/officeDocument/2006/relationships" xmlns:p="http://schemas.openxmlformats.org/presentationml/2006/main">
   <p:cSld>
+    <p:bg>
+      <p:bgPr>
+        <a:solidFill>
+          <a:srgbClr val="EAEAEB"/>
+        </a:solidFill>
+        <a:effectLst/>
+      </p:bgPr>
+    </p:bg>
     <p:spTree>
       <p:nvGrpSpPr>
         <p:cNvPr id="1" name="">
           <a:extLst>
             <a:ext uri="{FF2B5EF4-FFF2-40B4-BE49-F238E27FC236}">
-              <a16:creationId xmlns:a16="http://schemas.microsoft.com/office/drawing/2014/main" id="{2A5369C3-419B-8999-4ADA-CDFF9537CCB8}"/>
+              <a16:creationId xmlns:a16="http://schemas.microsoft.com/office/drawing/2014/main" id="{94328526-D41C-6530-33A1-C8DB170D6EC3}"/>
             </a:ext>
           </a:extLst>
         </p:cNvPr>
@@ -4819,10 +5263,10 @@
       </p:grpSpPr>
       <p:pic>
         <p:nvPicPr>
-          <p:cNvPr id="3" name="Picture 2" descr="A diagram of a model&#10;&#10;Description automatically generated">
-            <a:extLst>
-              <a:ext uri="{FF2B5EF4-FFF2-40B4-BE49-F238E27FC236}">
-                <a16:creationId xmlns:a16="http://schemas.microsoft.com/office/drawing/2014/main" id="{2DEB727C-F3B6-C9A2-A564-F1FE23BAD4DD}"/>
+          <p:cNvPr id="8" name="Picture 7" descr="A screenshot of a computer&#10;&#10;Description automatically generated">
+            <a:extLst>
+              <a:ext uri="{FF2B5EF4-FFF2-40B4-BE49-F238E27FC236}">
+                <a16:creationId xmlns:a16="http://schemas.microsoft.com/office/drawing/2014/main" id="{C82F4BCC-BD67-DC98-297E-E920A110FB34}"/>
               </a:ext>
             </a:extLst>
           </p:cNvPr>
@@ -4839,20 +5283,674 @@
         </p:blipFill>
         <p:spPr>
           <a:xfrm>
-            <a:off x="2829618" y="223941"/>
-            <a:ext cx="8721250" cy="3205059"/>
+            <a:off x="6751454" y="1320906"/>
+            <a:ext cx="5291667" cy="4947708"/>
+          </a:xfrm>
+          <a:prstGeom prst="rect">
+            <a:avLst/>
+          </a:prstGeom>
+          <a:solidFill>
+            <a:srgbClr val="EAEAEB">
+              <a:alpha val="99000"/>
+            </a:srgbClr>
+          </a:solidFill>
+        </p:spPr>
+      </p:pic>
+      <p:pic>
+        <p:nvPicPr>
+          <p:cNvPr id="3" name="Picture 2" descr="A hexagon with a sign and a arrow&#10;&#10;Description automatically generated">
+            <a:extLst>
+              <a:ext uri="{FF2B5EF4-FFF2-40B4-BE49-F238E27FC236}">
+                <a16:creationId xmlns:a16="http://schemas.microsoft.com/office/drawing/2014/main" id="{48FF060C-23CF-09A1-A547-6484DA79CB64}"/>
+              </a:ext>
+            </a:extLst>
+          </p:cNvPr>
+          <p:cNvPicPr>
+            <a:picLocks noChangeAspect="1"/>
+          </p:cNvPicPr>
+          <p:nvPr/>
+        </p:nvPicPr>
+        <p:blipFill>
+          <a:blip r:embed="rId4"/>
+          <a:stretch>
+            <a:fillRect/>
+          </a:stretch>
+        </p:blipFill>
+        <p:spPr>
+          <a:xfrm>
+            <a:off x="3710633" y="2423160"/>
+            <a:ext cx="2384755" cy="2743200"/>
           </a:xfrm>
           <a:prstGeom prst="rect">
             <a:avLst/>
           </a:prstGeom>
         </p:spPr>
       </p:pic>
-      <p:sp>
-        <p:nvSpPr>
-          <p:cNvPr id="5" name="Rounded Rectangle 4">
-            <a:extLst>
-              <a:ext uri="{FF2B5EF4-FFF2-40B4-BE49-F238E27FC236}">
-                <a16:creationId xmlns:a16="http://schemas.microsoft.com/office/drawing/2014/main" id="{9D2AF731-A9EF-A057-1D52-DA2093F39675}"/>
+      <p:pic>
+        <p:nvPicPr>
+          <p:cNvPr id="4" name="Picture 4" descr="Hex logo for Quarto - a white circle segmented into quarters next to the text Quarto on a blue background.">
+            <a:extLst>
+              <a:ext uri="{FF2B5EF4-FFF2-40B4-BE49-F238E27FC236}">
+                <a16:creationId xmlns:a16="http://schemas.microsoft.com/office/drawing/2014/main" id="{5C400ECE-1343-7989-1A9B-8AD11516ED74}"/>
+              </a:ext>
+            </a:extLst>
+          </p:cNvPr>
+          <p:cNvPicPr>
+            <a:picLocks noChangeAspect="1" noChangeArrowheads="1"/>
+          </p:cNvPicPr>
+          <p:nvPr/>
+        </p:nvPicPr>
+        <p:blipFill>
+          <a:blip r:embed="rId5">
+            <a:extLst>
+              <a:ext uri="{28A0092B-C50C-407E-A947-70E740481C1C}">
+                <a14:useLocalDpi xmlns:a14="http://schemas.microsoft.com/office/drawing/2010/main" val="0"/>
+              </a:ext>
+            </a:extLst>
+          </a:blip>
+          <a:srcRect/>
+          <a:stretch>
+            <a:fillRect/>
+          </a:stretch>
+        </p:blipFill>
+        <p:spPr bwMode="auto">
+          <a:xfrm>
+            <a:off x="417753" y="2423160"/>
+            <a:ext cx="2376780" cy="2743200"/>
+          </a:xfrm>
+          <a:prstGeom prst="rect">
+            <a:avLst/>
+          </a:prstGeom>
+          <a:noFill/>
+          <a:extLst>
+            <a:ext uri="{909E8E84-426E-40DD-AFC4-6F175D3DCCD1}">
+              <a14:hiddenFill xmlns:a14="http://schemas.microsoft.com/office/drawing/2010/main">
+                <a:solidFill>
+                  <a:srgbClr val="FFFFFF"/>
+                </a:solidFill>
+              </a14:hiddenFill>
+            </a:ext>
+          </a:extLst>
+        </p:spPr>
+      </p:pic>
+      <p:sp>
+        <p:nvSpPr>
+          <p:cNvPr id="5" name="TextBox 4">
+            <a:extLst>
+              <a:ext uri="{FF2B5EF4-FFF2-40B4-BE49-F238E27FC236}">
+                <a16:creationId xmlns:a16="http://schemas.microsoft.com/office/drawing/2014/main" id="{049242D9-D73D-4BB1-A0E3-95E1DF362804}"/>
+              </a:ext>
+            </a:extLst>
+          </p:cNvPr>
+          <p:cNvSpPr txBox="1"/>
+          <p:nvPr/>
+        </p:nvSpPr>
+        <p:spPr>
+          <a:xfrm>
+            <a:off x="2894953" y="3071485"/>
+            <a:ext cx="715260" cy="1446550"/>
+          </a:xfrm>
+          <a:prstGeom prst="rect">
+            <a:avLst/>
+          </a:prstGeom>
+          <a:noFill/>
+        </p:spPr>
+        <p:txBody>
+          <a:bodyPr wrap="none" rtlCol="0">
+            <a:spAutoFit/>
+          </a:bodyPr>
+          <a:lstStyle/>
+          <a:p>
+            <a:r>
+              <a:rPr lang="en-US" sz="8800" dirty="0">
+                <a:latin typeface="Fira Sans Condensed Medium" panose="020B0603050000020004" pitchFamily="34" charset="0"/>
+              </a:rPr>
+              <a:t>+</a:t>
+            </a:r>
+          </a:p>
+        </p:txBody>
+      </p:sp>
+      <p:sp>
+        <p:nvSpPr>
+          <p:cNvPr id="6" name="TextBox 5">
+            <a:extLst>
+              <a:ext uri="{FF2B5EF4-FFF2-40B4-BE49-F238E27FC236}">
+                <a16:creationId xmlns:a16="http://schemas.microsoft.com/office/drawing/2014/main" id="{E9AFB6F6-C224-8059-14D9-94A7F6B7AC70}"/>
+              </a:ext>
+            </a:extLst>
+          </p:cNvPr>
+          <p:cNvSpPr txBox="1"/>
+          <p:nvPr/>
+        </p:nvSpPr>
+        <p:spPr>
+          <a:xfrm>
+            <a:off x="6195807" y="3071485"/>
+            <a:ext cx="705642" cy="1446550"/>
+          </a:xfrm>
+          <a:prstGeom prst="rect">
+            <a:avLst/>
+          </a:prstGeom>
+          <a:noFill/>
+        </p:spPr>
+        <p:txBody>
+          <a:bodyPr wrap="none" rtlCol="0">
+            <a:spAutoFit/>
+          </a:bodyPr>
+          <a:lstStyle/>
+          <a:p>
+            <a:r>
+              <a:rPr lang="en-US" sz="8800" dirty="0">
+                <a:latin typeface="Fira Sans Condensed Medium" panose="020B0603050000020004" pitchFamily="34" charset="0"/>
+              </a:rPr>
+              <a:t>=</a:t>
+            </a:r>
+          </a:p>
+        </p:txBody>
+      </p:sp>
+      <p:sp>
+        <p:nvSpPr>
+          <p:cNvPr id="7" name="TextBox 6">
+            <a:extLst>
+              <a:ext uri="{FF2B5EF4-FFF2-40B4-BE49-F238E27FC236}">
+                <a16:creationId xmlns:a16="http://schemas.microsoft.com/office/drawing/2014/main" id="{7BC3136E-AB1F-69A6-017E-D4B2AB8969A7}"/>
+              </a:ext>
+            </a:extLst>
+          </p:cNvPr>
+          <p:cNvSpPr txBox="1"/>
+          <p:nvPr/>
+        </p:nvSpPr>
+        <p:spPr>
+          <a:xfrm>
+            <a:off x="0" y="185705"/>
+            <a:ext cx="12192000" cy="769441"/>
+          </a:xfrm>
+          <a:prstGeom prst="rect">
+            <a:avLst/>
+          </a:prstGeom>
+          <a:noFill/>
+        </p:spPr>
+        <p:txBody>
+          <a:bodyPr wrap="square" rtlCol="0">
+            <a:spAutoFit/>
+          </a:bodyPr>
+          <a:lstStyle/>
+          <a:p>
+            <a:pPr algn="ctr"/>
+            <a:r>
+              <a:rPr lang="en-US" sz="4400" dirty="0">
+                <a:latin typeface="Fira Sans Condensed Medium" panose="020B0603050000020004" pitchFamily="34" charset="0"/>
+              </a:rPr>
+              <a:t>R package that renders Quarto files into surveys</a:t>
+            </a:r>
+          </a:p>
+        </p:txBody>
+      </p:sp>
+    </p:spTree>
+    <p:extLst>
+      <p:ext uri="{BB962C8B-B14F-4D97-AF65-F5344CB8AC3E}">
+        <p14:creationId xmlns:p14="http://schemas.microsoft.com/office/powerpoint/2010/main" val="1215931787"/>
+      </p:ext>
+    </p:extLst>
+  </p:cSld>
+  <p:clrMapOvr>
+    <a:masterClrMapping/>
+  </p:clrMapOvr>
+</p:sld>
+</file>
+
+<file path=ppt/slides/slide11.xml><?xml version="1.0" encoding="utf-8"?>
+<p:sld xmlns:a="http://schemas.openxmlformats.org/drawingml/2006/main" xmlns:r="http://schemas.openxmlformats.org/officeDocument/2006/relationships" xmlns:p="http://schemas.openxmlformats.org/presentationml/2006/main">
+  <p:cSld>
+    <p:bg>
+      <p:bgPr>
+        <a:solidFill>
+          <a:srgbClr val="EAEAEB"/>
+        </a:solidFill>
+        <a:effectLst/>
+      </p:bgPr>
+    </p:bg>
+    <p:spTree>
+      <p:nvGrpSpPr>
+        <p:cNvPr id="1" name="">
+          <a:extLst>
+            <a:ext uri="{FF2B5EF4-FFF2-40B4-BE49-F238E27FC236}">
+              <a16:creationId xmlns:a16="http://schemas.microsoft.com/office/drawing/2014/main" id="{A24C025D-830B-0E30-2157-3AEA55088A0D}"/>
+            </a:ext>
+          </a:extLst>
+        </p:cNvPr>
+        <p:cNvGrpSpPr/>
+        <p:nvPr/>
+      </p:nvGrpSpPr>
+      <p:grpSpPr>
+        <a:xfrm>
+          <a:off x="0" y="0"/>
+          <a:ext cx="0" cy="0"/>
+          <a:chOff x="0" y="0"/>
+          <a:chExt cx="0" cy="0"/>
+        </a:xfrm>
+      </p:grpSpPr>
+      <p:pic>
+        <p:nvPicPr>
+          <p:cNvPr id="8" name="Picture 7" descr="A screenshot of a computer&#10;&#10;Description automatically generated">
+            <a:extLst>
+              <a:ext uri="{FF2B5EF4-FFF2-40B4-BE49-F238E27FC236}">
+                <a16:creationId xmlns:a16="http://schemas.microsoft.com/office/drawing/2014/main" id="{8BCC3D4E-EB47-C5A9-56D9-A49E0DBA3ADF}"/>
+              </a:ext>
+            </a:extLst>
+          </p:cNvPr>
+          <p:cNvPicPr>
+            <a:picLocks noChangeAspect="1"/>
+          </p:cNvPicPr>
+          <p:nvPr/>
+        </p:nvPicPr>
+        <p:blipFill>
+          <a:blip r:embed="rId3"/>
+          <a:stretch>
+            <a:fillRect/>
+          </a:stretch>
+        </p:blipFill>
+        <p:spPr>
+          <a:xfrm>
+            <a:off x="6751454" y="1320906"/>
+            <a:ext cx="5291667" cy="4947708"/>
+          </a:xfrm>
+          <a:prstGeom prst="rect">
+            <a:avLst/>
+          </a:prstGeom>
+          <a:solidFill>
+            <a:srgbClr val="EAEAEB">
+              <a:alpha val="99000"/>
+            </a:srgbClr>
+          </a:solidFill>
+        </p:spPr>
+      </p:pic>
+      <p:pic>
+        <p:nvPicPr>
+          <p:cNvPr id="3" name="Picture 2" descr="A hexagon with a sign and a arrow&#10;&#10;Description automatically generated">
+            <a:extLst>
+              <a:ext uri="{FF2B5EF4-FFF2-40B4-BE49-F238E27FC236}">
+                <a16:creationId xmlns:a16="http://schemas.microsoft.com/office/drawing/2014/main" id="{9E08CEF3-96E8-A137-CB14-5268E857404E}"/>
+              </a:ext>
+            </a:extLst>
+          </p:cNvPr>
+          <p:cNvPicPr>
+            <a:picLocks noChangeAspect="1"/>
+          </p:cNvPicPr>
+          <p:nvPr/>
+        </p:nvPicPr>
+        <p:blipFill>
+          <a:blip r:embed="rId4"/>
+          <a:stretch>
+            <a:fillRect/>
+          </a:stretch>
+        </p:blipFill>
+        <p:spPr>
+          <a:xfrm>
+            <a:off x="3710633" y="2423160"/>
+            <a:ext cx="2384755" cy="2743200"/>
+          </a:xfrm>
+          <a:prstGeom prst="rect">
+            <a:avLst/>
+          </a:prstGeom>
+        </p:spPr>
+      </p:pic>
+      <p:pic>
+        <p:nvPicPr>
+          <p:cNvPr id="4" name="Picture 4" descr="Hex logo for Quarto - a white circle segmented into quarters next to the text Quarto on a blue background.">
+            <a:extLst>
+              <a:ext uri="{FF2B5EF4-FFF2-40B4-BE49-F238E27FC236}">
+                <a16:creationId xmlns:a16="http://schemas.microsoft.com/office/drawing/2014/main" id="{3BC54550-CDB5-388F-D22C-A72E6A1A6A29}"/>
+              </a:ext>
+            </a:extLst>
+          </p:cNvPr>
+          <p:cNvPicPr>
+            <a:picLocks noChangeAspect="1" noChangeArrowheads="1"/>
+          </p:cNvPicPr>
+          <p:nvPr/>
+        </p:nvPicPr>
+        <p:blipFill>
+          <a:blip r:embed="rId5">
+            <a:extLst>
+              <a:ext uri="{28A0092B-C50C-407E-A947-70E740481C1C}">
+                <a14:useLocalDpi xmlns:a14="http://schemas.microsoft.com/office/drawing/2010/main" val="0"/>
+              </a:ext>
+            </a:extLst>
+          </a:blip>
+          <a:srcRect/>
+          <a:stretch>
+            <a:fillRect/>
+          </a:stretch>
+        </p:blipFill>
+        <p:spPr bwMode="auto">
+          <a:xfrm>
+            <a:off x="417753" y="2423160"/>
+            <a:ext cx="2376780" cy="2743200"/>
+          </a:xfrm>
+          <a:prstGeom prst="rect">
+            <a:avLst/>
+          </a:prstGeom>
+          <a:noFill/>
+          <a:extLst>
+            <a:ext uri="{909E8E84-426E-40DD-AFC4-6F175D3DCCD1}">
+              <a14:hiddenFill xmlns:a14="http://schemas.microsoft.com/office/drawing/2010/main">
+                <a:solidFill>
+                  <a:srgbClr val="FFFFFF"/>
+                </a:solidFill>
+              </a14:hiddenFill>
+            </a:ext>
+          </a:extLst>
+        </p:spPr>
+      </p:pic>
+      <p:sp>
+        <p:nvSpPr>
+          <p:cNvPr id="5" name="TextBox 4">
+            <a:extLst>
+              <a:ext uri="{FF2B5EF4-FFF2-40B4-BE49-F238E27FC236}">
+                <a16:creationId xmlns:a16="http://schemas.microsoft.com/office/drawing/2014/main" id="{6202F5C4-7056-7B90-1DFE-52D718234550}"/>
+              </a:ext>
+            </a:extLst>
+          </p:cNvPr>
+          <p:cNvSpPr txBox="1"/>
+          <p:nvPr/>
+        </p:nvSpPr>
+        <p:spPr>
+          <a:xfrm>
+            <a:off x="2894953" y="3071485"/>
+            <a:ext cx="715260" cy="1446550"/>
+          </a:xfrm>
+          <a:prstGeom prst="rect">
+            <a:avLst/>
+          </a:prstGeom>
+          <a:noFill/>
+        </p:spPr>
+        <p:txBody>
+          <a:bodyPr wrap="none" rtlCol="0">
+            <a:spAutoFit/>
+          </a:bodyPr>
+          <a:lstStyle/>
+          <a:p>
+            <a:r>
+              <a:rPr lang="en-US" sz="8800" dirty="0">
+                <a:latin typeface="Fira Sans Condensed Medium" panose="020B0603050000020004" pitchFamily="34" charset="0"/>
+              </a:rPr>
+              <a:t>+</a:t>
+            </a:r>
+          </a:p>
+        </p:txBody>
+      </p:sp>
+      <p:sp>
+        <p:nvSpPr>
+          <p:cNvPr id="6" name="TextBox 5">
+            <a:extLst>
+              <a:ext uri="{FF2B5EF4-FFF2-40B4-BE49-F238E27FC236}">
+                <a16:creationId xmlns:a16="http://schemas.microsoft.com/office/drawing/2014/main" id="{111FE4A1-E93B-C00B-B70C-C9B56C25D224}"/>
+              </a:ext>
+            </a:extLst>
+          </p:cNvPr>
+          <p:cNvSpPr txBox="1"/>
+          <p:nvPr/>
+        </p:nvSpPr>
+        <p:spPr>
+          <a:xfrm>
+            <a:off x="6195807" y="3071485"/>
+            <a:ext cx="705642" cy="1446550"/>
+          </a:xfrm>
+          <a:prstGeom prst="rect">
+            <a:avLst/>
+          </a:prstGeom>
+          <a:noFill/>
+        </p:spPr>
+        <p:txBody>
+          <a:bodyPr wrap="none" rtlCol="0">
+            <a:spAutoFit/>
+          </a:bodyPr>
+          <a:lstStyle/>
+          <a:p>
+            <a:r>
+              <a:rPr lang="en-US" sz="8800" dirty="0">
+                <a:latin typeface="Fira Sans Condensed Medium" panose="020B0603050000020004" pitchFamily="34" charset="0"/>
+              </a:rPr>
+              <a:t>=</a:t>
+            </a:r>
+          </a:p>
+        </p:txBody>
+      </p:sp>
+    </p:spTree>
+    <p:extLst>
+      <p:ext uri="{BB962C8B-B14F-4D97-AF65-F5344CB8AC3E}">
+        <p14:creationId xmlns:p14="http://schemas.microsoft.com/office/powerpoint/2010/main" val="366611496"/>
+      </p:ext>
+    </p:extLst>
+  </p:cSld>
+  <p:clrMapOvr>
+    <a:masterClrMapping/>
+  </p:clrMapOvr>
+</p:sld>
+</file>
+
+<file path=ppt/slides/slide12.xml><?xml version="1.0" encoding="utf-8"?>
+<p:sld xmlns:a="http://schemas.openxmlformats.org/drawingml/2006/main" xmlns:r="http://schemas.openxmlformats.org/officeDocument/2006/relationships" xmlns:p="http://schemas.openxmlformats.org/presentationml/2006/main">
+  <p:cSld>
+    <p:bg>
+      <p:bgPr>
+        <a:solidFill>
+          <a:srgbClr val="EAEAEB"/>
+        </a:solidFill>
+        <a:effectLst/>
+      </p:bgPr>
+    </p:bg>
+    <p:spTree>
+      <p:nvGrpSpPr>
+        <p:cNvPr id="1" name="">
+          <a:extLst>
+            <a:ext uri="{FF2B5EF4-FFF2-40B4-BE49-F238E27FC236}">
+              <a16:creationId xmlns:a16="http://schemas.microsoft.com/office/drawing/2014/main" id="{65B89D66-015D-AEE8-0A18-BB4BF51BDA66}"/>
+            </a:ext>
+          </a:extLst>
+        </p:cNvPr>
+        <p:cNvGrpSpPr/>
+        <p:nvPr/>
+      </p:nvGrpSpPr>
+      <p:grpSpPr>
+        <a:xfrm>
+          <a:off x="0" y="0"/>
+          <a:ext cx="0" cy="0"/>
+          <a:chOff x="0" y="0"/>
+          <a:chExt cx="0" cy="0"/>
+        </a:xfrm>
+      </p:grpSpPr>
+      <p:pic>
+        <p:nvPicPr>
+          <p:cNvPr id="8" name="Picture 7" descr="A screenshot of a computer&#10;&#10;Description automatically generated">
+            <a:extLst>
+              <a:ext uri="{FF2B5EF4-FFF2-40B4-BE49-F238E27FC236}">
+                <a16:creationId xmlns:a16="http://schemas.microsoft.com/office/drawing/2014/main" id="{1041F572-CAE2-FD19-80B3-4522E5BE8437}"/>
+              </a:ext>
+            </a:extLst>
+          </p:cNvPr>
+          <p:cNvPicPr>
+            <a:picLocks noChangeAspect="1"/>
+          </p:cNvPicPr>
+          <p:nvPr/>
+        </p:nvPicPr>
+        <p:blipFill>
+          <a:blip r:embed="rId3"/>
+          <a:stretch>
+            <a:fillRect/>
+          </a:stretch>
+        </p:blipFill>
+        <p:spPr>
+          <a:xfrm>
+            <a:off x="6751454" y="1320906"/>
+            <a:ext cx="5291667" cy="4947708"/>
+          </a:xfrm>
+          <a:prstGeom prst="rect">
+            <a:avLst/>
+          </a:prstGeom>
+          <a:solidFill>
+            <a:srgbClr val="EAEAEB">
+              <a:alpha val="99000"/>
+            </a:srgbClr>
+          </a:solidFill>
+        </p:spPr>
+      </p:pic>
+      <p:pic>
+        <p:nvPicPr>
+          <p:cNvPr id="3" name="Picture 2" descr="A hexagon with a sign and a arrow&#10;&#10;Description automatically generated">
+            <a:extLst>
+              <a:ext uri="{FF2B5EF4-FFF2-40B4-BE49-F238E27FC236}">
+                <a16:creationId xmlns:a16="http://schemas.microsoft.com/office/drawing/2014/main" id="{C80F439F-25F2-3A57-140A-7BEF01623ADC}"/>
+              </a:ext>
+            </a:extLst>
+          </p:cNvPr>
+          <p:cNvPicPr>
+            <a:picLocks noChangeAspect="1"/>
+          </p:cNvPicPr>
+          <p:nvPr/>
+        </p:nvPicPr>
+        <p:blipFill>
+          <a:blip r:embed="rId4"/>
+          <a:stretch>
+            <a:fillRect/>
+          </a:stretch>
+        </p:blipFill>
+        <p:spPr>
+          <a:xfrm>
+            <a:off x="3720161" y="1364786"/>
+            <a:ext cx="1681019" cy="1933687"/>
+          </a:xfrm>
+          <a:prstGeom prst="rect">
+            <a:avLst/>
+          </a:prstGeom>
+        </p:spPr>
+      </p:pic>
+      <p:pic>
+        <p:nvPicPr>
+          <p:cNvPr id="4" name="Picture 4" descr="Hex logo for Quarto - a white circle segmented into quarters next to the text Quarto on a blue background.">
+            <a:extLst>
+              <a:ext uri="{FF2B5EF4-FFF2-40B4-BE49-F238E27FC236}">
+                <a16:creationId xmlns:a16="http://schemas.microsoft.com/office/drawing/2014/main" id="{26E4E4F3-8EEB-F543-A27D-284DFF32C9B0}"/>
+              </a:ext>
+            </a:extLst>
+          </p:cNvPr>
+          <p:cNvPicPr>
+            <a:picLocks noChangeAspect="1" noChangeArrowheads="1"/>
+          </p:cNvPicPr>
+          <p:nvPr/>
+        </p:nvPicPr>
+        <p:blipFill>
+          <a:blip r:embed="rId5">
+            <a:extLst>
+              <a:ext uri="{28A0092B-C50C-407E-A947-70E740481C1C}">
+                <a14:useLocalDpi xmlns:a14="http://schemas.microsoft.com/office/drawing/2010/main" val="0"/>
+              </a:ext>
+            </a:extLst>
+          </a:blip>
+          <a:srcRect/>
+          <a:stretch>
+            <a:fillRect/>
+          </a:stretch>
+        </p:blipFill>
+        <p:spPr bwMode="auto">
+          <a:xfrm>
+            <a:off x="925997" y="1364786"/>
+            <a:ext cx="1675397" cy="1933687"/>
+          </a:xfrm>
+          <a:prstGeom prst="rect">
+            <a:avLst/>
+          </a:prstGeom>
+          <a:noFill/>
+          <a:extLst>
+            <a:ext uri="{909E8E84-426E-40DD-AFC4-6F175D3DCCD1}">
+              <a14:hiddenFill xmlns:a14="http://schemas.microsoft.com/office/drawing/2010/main">
+                <a:solidFill>
+                  <a:srgbClr val="FFFFFF"/>
+                </a:solidFill>
+              </a14:hiddenFill>
+            </a:ext>
+          </a:extLst>
+        </p:spPr>
+      </p:pic>
+      <p:sp>
+        <p:nvSpPr>
+          <p:cNvPr id="5" name="TextBox 4">
+            <a:extLst>
+              <a:ext uri="{FF2B5EF4-FFF2-40B4-BE49-F238E27FC236}">
+                <a16:creationId xmlns:a16="http://schemas.microsoft.com/office/drawing/2014/main" id="{681D2F7D-827A-1E49-B2D6-4933B17646C1}"/>
+              </a:ext>
+            </a:extLst>
+          </p:cNvPr>
+          <p:cNvSpPr txBox="1"/>
+          <p:nvPr/>
+        </p:nvSpPr>
+        <p:spPr>
+          <a:xfrm>
+            <a:off x="2840343" y="1618306"/>
+            <a:ext cx="504188" cy="1446550"/>
+          </a:xfrm>
+          <a:prstGeom prst="rect">
+            <a:avLst/>
+          </a:prstGeom>
+          <a:noFill/>
+        </p:spPr>
+        <p:txBody>
+          <a:bodyPr wrap="square" rtlCol="0">
+            <a:spAutoFit/>
+          </a:bodyPr>
+          <a:lstStyle/>
+          <a:p>
+            <a:r>
+              <a:rPr lang="en-US" sz="8800" dirty="0">
+                <a:latin typeface="Fira Sans Condensed Medium" panose="020B0603050000020004" pitchFamily="34" charset="0"/>
+              </a:rPr>
+              <a:t>+</a:t>
+            </a:r>
+          </a:p>
+        </p:txBody>
+      </p:sp>
+      <p:sp>
+        <p:nvSpPr>
+          <p:cNvPr id="6" name="TextBox 5">
+            <a:extLst>
+              <a:ext uri="{FF2B5EF4-FFF2-40B4-BE49-F238E27FC236}">
+                <a16:creationId xmlns:a16="http://schemas.microsoft.com/office/drawing/2014/main" id="{B23227CA-1995-FE2B-16B7-5EEA844B91E9}"/>
+              </a:ext>
+            </a:extLst>
+          </p:cNvPr>
+          <p:cNvSpPr txBox="1"/>
+          <p:nvPr/>
+        </p:nvSpPr>
+        <p:spPr>
+          <a:xfrm>
+            <a:off x="6195807" y="3071485"/>
+            <a:ext cx="705642" cy="1446550"/>
+          </a:xfrm>
+          <a:prstGeom prst="rect">
+            <a:avLst/>
+          </a:prstGeom>
+          <a:noFill/>
+        </p:spPr>
+        <p:txBody>
+          <a:bodyPr wrap="none" rtlCol="0">
+            <a:spAutoFit/>
+          </a:bodyPr>
+          <a:lstStyle/>
+          <a:p>
+            <a:r>
+              <a:rPr lang="en-US" sz="8800" dirty="0">
+                <a:latin typeface="Fira Sans Condensed Medium" panose="020B0603050000020004" pitchFamily="34" charset="0"/>
+              </a:rPr>
+              <a:t>=</a:t>
+            </a:r>
+          </a:p>
+        </p:txBody>
+      </p:sp>
+      <p:sp>
+        <p:nvSpPr>
+          <p:cNvPr id="2" name="Rounded Rectangle 1">
+            <a:extLst>
+              <a:ext uri="{FF2B5EF4-FFF2-40B4-BE49-F238E27FC236}">
+                <a16:creationId xmlns:a16="http://schemas.microsoft.com/office/drawing/2014/main" id="{65565892-9E67-BA90-749D-6307707074AB}"/>
               </a:ext>
             </a:extLst>
           </p:cNvPr>
@@ -4861,8 +5959,8 @@
         </p:nvSpPr>
         <p:spPr>
           <a:xfrm>
-            <a:off x="599089" y="223941"/>
-            <a:ext cx="1881352" cy="2894375"/>
+            <a:off x="304799" y="450929"/>
+            <a:ext cx="5791201" cy="5956142"/>
           </a:xfrm>
           <a:prstGeom prst="roundRect">
             <a:avLst>
@@ -4870,7 +5968,7 @@
             </a:avLst>
           </a:prstGeom>
           <a:noFill/>
-          <a:ln>
+          <a:ln w="38100">
             <a:solidFill>
               <a:srgbClr val="FF0000"/>
             </a:solidFill>
@@ -4893,7 +5991,7 @@
           </a:fontRef>
         </p:style>
         <p:txBody>
-          <a:bodyPr rtlCol="0" anchor="ctr"/>
+          <a:bodyPr rtlCol="0" anchor="t"/>
           <a:lstStyle/>
           <a:p>
             <a:pPr algn="ctr"/>
@@ -4902,118 +6000,198 @@
                 <a:solidFill>
                   <a:srgbClr val="FF0000"/>
                 </a:solidFill>
-                <a:latin typeface="Roboto" panose="02000000000000000000" pitchFamily="2" charset="0"/>
+                <a:latin typeface="Fira Sans Condensed Medium" panose="020B0603050000020004" pitchFamily="34" charset="0"/>
                 <a:ea typeface="Roboto" panose="02000000000000000000" pitchFamily="2" charset="0"/>
               </a:rPr>
-              <a:t>Collect</a:t>
+              <a:t>Shiny App</a:t>
             </a:r>
           </a:p>
+        </p:txBody>
+      </p:sp>
+      <p:sp>
+        <p:nvSpPr>
+          <p:cNvPr id="10" name="Rounded Rectangle 9">
+            <a:extLst>
+              <a:ext uri="{FF2B5EF4-FFF2-40B4-BE49-F238E27FC236}">
+                <a16:creationId xmlns:a16="http://schemas.microsoft.com/office/drawing/2014/main" id="{4E4B383E-F81A-2551-C1E9-1E085801FBBC}"/>
+              </a:ext>
+            </a:extLst>
+          </p:cNvPr>
+          <p:cNvSpPr/>
+          <p:nvPr/>
+        </p:nvSpPr>
+        <p:spPr>
+          <a:xfrm>
+            <a:off x="623988" y="1198581"/>
+            <a:ext cx="5152822" cy="2286000"/>
+          </a:xfrm>
+          <a:prstGeom prst="roundRect">
+            <a:avLst>
+              <a:gd name="adj" fmla="val 7170"/>
+            </a:avLst>
+          </a:prstGeom>
+          <a:noFill/>
+          <a:ln w="38100">
+            <a:solidFill>
+              <a:schemeClr val="accent3">
+                <a:lumMod val="60000"/>
+                <a:lumOff val="40000"/>
+              </a:schemeClr>
+            </a:solidFill>
+          </a:ln>
+        </p:spPr>
+        <p:style>
+          <a:lnRef idx="2">
+            <a:schemeClr val="accent1">
+              <a:shade val="15000"/>
+            </a:schemeClr>
+          </a:lnRef>
+          <a:fillRef idx="1">
+            <a:schemeClr val="accent1"/>
+          </a:fillRef>
+          <a:effectRef idx="0">
+            <a:schemeClr val="accent1"/>
+          </a:effectRef>
+          <a:fontRef idx="minor">
+            <a:schemeClr val="lt1"/>
+          </a:fontRef>
+        </p:style>
+        <p:txBody>
+          <a:bodyPr rtlCol="0" anchor="t"/>
+          <a:lstStyle/>
           <a:p>
             <a:pPr algn="ctr"/>
             <a:r>
               <a:rPr lang="en-US" sz="2200" dirty="0">
                 <a:solidFill>
-                  <a:srgbClr val="FF0000"/>
+                  <a:schemeClr val="accent3">
+                    <a:lumMod val="60000"/>
+                    <a:lumOff val="40000"/>
+                  </a:schemeClr>
                 </a:solidFill>
-                <a:latin typeface="Roboto" panose="02000000000000000000" pitchFamily="2" charset="0"/>
+                <a:latin typeface="Fira Sans Condensed Medium" panose="020B0603050000020004" pitchFamily="34" charset="0"/>
                 <a:ea typeface="Roboto" panose="02000000000000000000" pitchFamily="2" charset="0"/>
               </a:rPr>
-              <a:t>Data</a:t>
+              <a:t>UI</a:t>
             </a:r>
           </a:p>
         </p:txBody>
       </p:sp>
-      <p:cxnSp>
-        <p:nvCxnSpPr>
-          <p:cNvPr id="8" name="Straight Arrow Connector 7">
-            <a:extLst>
-              <a:ext uri="{FF2B5EF4-FFF2-40B4-BE49-F238E27FC236}">
-                <a16:creationId xmlns:a16="http://schemas.microsoft.com/office/drawing/2014/main" id="{6791545A-C1B7-B0A2-ECF3-65932106E726}"/>
-              </a:ext>
-            </a:extLst>
-          </p:cNvPr>
-          <p:cNvCxnSpPr>
-            <a:stCxn id="5" idx="3"/>
-          </p:cNvCxnSpPr>
+    </p:spTree>
+    <p:extLst>
+      <p:ext uri="{BB962C8B-B14F-4D97-AF65-F5344CB8AC3E}">
+        <p14:creationId xmlns:p14="http://schemas.microsoft.com/office/powerpoint/2010/main" val="1032620143"/>
+      </p:ext>
+    </p:extLst>
+  </p:cSld>
+  <p:clrMapOvr>
+    <a:masterClrMapping/>
+  </p:clrMapOvr>
+</p:sld>
+</file>
+
+<file path=ppt/slides/slide13.xml><?xml version="1.0" encoding="utf-8"?>
+<p:sld xmlns:a="http://schemas.openxmlformats.org/drawingml/2006/main" xmlns:r="http://schemas.openxmlformats.org/officeDocument/2006/relationships" xmlns:p="http://schemas.openxmlformats.org/presentationml/2006/main">
+  <p:cSld>
+    <p:bg>
+      <p:bgPr>
+        <a:solidFill>
+          <a:srgbClr val="EAEAEB"/>
+        </a:solidFill>
+        <a:effectLst/>
+      </p:bgPr>
+    </p:bg>
+    <p:spTree>
+      <p:nvGrpSpPr>
+        <p:cNvPr id="1" name="">
+          <a:extLst>
+            <a:ext uri="{FF2B5EF4-FFF2-40B4-BE49-F238E27FC236}">
+              <a16:creationId xmlns:a16="http://schemas.microsoft.com/office/drawing/2014/main" id="{3FBB4CA3-F301-769F-ACBA-2ED3CF9A7295}"/>
+            </a:ext>
+          </a:extLst>
+        </p:cNvPr>
+        <p:cNvGrpSpPr/>
+        <p:nvPr/>
+      </p:nvGrpSpPr>
+      <p:grpSpPr>
+        <a:xfrm>
+          <a:off x="0" y="0"/>
+          <a:ext cx="0" cy="0"/>
+          <a:chOff x="0" y="0"/>
+          <a:chExt cx="0" cy="0"/>
+        </a:xfrm>
+      </p:grpSpPr>
+      <p:pic>
+        <p:nvPicPr>
+          <p:cNvPr id="8" name="Picture 7" descr="A screenshot of a computer&#10;&#10;Description automatically generated">
+            <a:extLst>
+              <a:ext uri="{FF2B5EF4-FFF2-40B4-BE49-F238E27FC236}">
+                <a16:creationId xmlns:a16="http://schemas.microsoft.com/office/drawing/2014/main" id="{7BE279EC-6724-85F3-5F36-61642A4ACBB9}"/>
+              </a:ext>
+            </a:extLst>
+          </p:cNvPr>
+          <p:cNvPicPr>
+            <a:picLocks noChangeAspect="1"/>
+          </p:cNvPicPr>
           <p:nvPr/>
-        </p:nvCxnSpPr>
-        <p:spPr>
-          <a:xfrm flipV="1">
-            <a:off x="2480441" y="1671128"/>
-            <a:ext cx="349177" cy="1"/>
-          </a:xfrm>
-          <a:prstGeom prst="straightConnector1">
-            <a:avLst/>
-          </a:prstGeom>
-          <a:ln>
-            <a:solidFill>
-              <a:srgbClr val="FF0000"/>
-            </a:solidFill>
-            <a:tailEnd type="triangle" w="lg" len="lg"/>
-          </a:ln>
-        </p:spPr>
-        <p:style>
-          <a:lnRef idx="2">
-            <a:schemeClr val="accent1"/>
-          </a:lnRef>
-          <a:fillRef idx="0">
-            <a:schemeClr val="accent1"/>
-          </a:fillRef>
-          <a:effectRef idx="1">
-            <a:schemeClr val="accent1"/>
-          </a:effectRef>
-          <a:fontRef idx="minor">
-            <a:schemeClr val="tx1"/>
-          </a:fontRef>
-        </p:style>
-      </p:cxnSp>
-      <p:sp>
-        <p:nvSpPr>
-          <p:cNvPr id="9" name="TextBox 8">
-            <a:extLst>
-              <a:ext uri="{FF2B5EF4-FFF2-40B4-BE49-F238E27FC236}">
-                <a16:creationId xmlns:a16="http://schemas.microsoft.com/office/drawing/2014/main" id="{DF7E4ED5-99F8-9441-8E62-1EA85105A5A5}"/>
-              </a:ext>
-            </a:extLst>
-          </p:cNvPr>
-          <p:cNvSpPr txBox="1"/>
-          <p:nvPr/>
-        </p:nvSpPr>
+        </p:nvPicPr>
+        <p:blipFill>
+          <a:blip r:embed="rId3"/>
+          <a:stretch>
+            <a:fillRect/>
+          </a:stretch>
+        </p:blipFill>
         <p:spPr>
           <a:xfrm>
-            <a:off x="607721" y="3090446"/>
-            <a:ext cx="795411" cy="338554"/>
+            <a:off x="6751454" y="1320906"/>
+            <a:ext cx="5291667" cy="4947708"/>
           </a:xfrm>
           <a:prstGeom prst="rect">
             <a:avLst/>
           </a:prstGeom>
-          <a:noFill/>
+          <a:solidFill>
+            <a:srgbClr val="EAEAEB">
+              <a:alpha val="99000"/>
+            </a:srgbClr>
+          </a:solidFill>
         </p:spPr>
-        <p:txBody>
-          <a:bodyPr wrap="none" rtlCol="0">
-            <a:spAutoFit/>
-          </a:bodyPr>
-          <a:lstStyle/>
-          <a:p>
-            <a:r>
-              <a:rPr lang="en-US" sz="1600" dirty="0">
-                <a:solidFill>
-                  <a:srgbClr val="FF0000"/>
-                </a:solidFill>
-                <a:latin typeface="Roboto" panose="02000000000000000000" pitchFamily="2" charset="0"/>
-                <a:ea typeface="Roboto" panose="02000000000000000000" pitchFamily="2" charset="0"/>
-              </a:rPr>
-              <a:t>Survey</a:t>
-            </a:r>
-          </a:p>
-        </p:txBody>
-      </p:sp>
+      </p:pic>
       <p:pic>
         <p:nvPicPr>
-          <p:cNvPr id="6" name="Picture 8">
-            <a:extLst>
-              <a:ext uri="{FF2B5EF4-FFF2-40B4-BE49-F238E27FC236}">
-                <a16:creationId xmlns:a16="http://schemas.microsoft.com/office/drawing/2014/main" id="{95FA6227-BF1C-6FF8-5138-D28553714EA9}"/>
+          <p:cNvPr id="3" name="Picture 2" descr="A hexagon with a sign and a arrow&#10;&#10;Description automatically generated">
+            <a:extLst>
+              <a:ext uri="{FF2B5EF4-FFF2-40B4-BE49-F238E27FC236}">
+                <a16:creationId xmlns:a16="http://schemas.microsoft.com/office/drawing/2014/main" id="{E5E5EEB2-93B7-7383-C260-00D4331723B9}"/>
+              </a:ext>
+            </a:extLst>
+          </p:cNvPr>
+          <p:cNvPicPr>
+            <a:picLocks noChangeAspect="1"/>
+          </p:cNvPicPr>
+          <p:nvPr/>
+        </p:nvPicPr>
+        <p:blipFill>
+          <a:blip r:embed="rId4"/>
+          <a:stretch>
+            <a:fillRect/>
+          </a:stretch>
+        </p:blipFill>
+        <p:spPr>
+          <a:xfrm>
+            <a:off x="3720161" y="1364786"/>
+            <a:ext cx="1681019" cy="1933687"/>
+          </a:xfrm>
+          <a:prstGeom prst="rect">
+            <a:avLst/>
+          </a:prstGeom>
+        </p:spPr>
+      </p:pic>
+      <p:pic>
+        <p:nvPicPr>
+          <p:cNvPr id="4" name="Picture 4" descr="Hex logo for Quarto - a white circle segmented into quarters next to the text Quarto on a blue background.">
+            <a:extLst>
+              <a:ext uri="{FF2B5EF4-FFF2-40B4-BE49-F238E27FC236}">
+                <a16:creationId xmlns:a16="http://schemas.microsoft.com/office/drawing/2014/main" id="{F48376A8-14A7-4AB1-8772-A72E51D292E9}"/>
               </a:ext>
             </a:extLst>
           </p:cNvPr>
@@ -5023,7 +6201,7 @@
           <p:nvPr/>
         </p:nvPicPr>
         <p:blipFill>
-          <a:blip r:embed="rId4">
+          <a:blip r:embed="rId5">
             <a:extLst>
               <a:ext uri="{28A0092B-C50C-407E-A947-70E740481C1C}">
                 <a14:useLocalDpi xmlns:a14="http://schemas.microsoft.com/office/drawing/2010/main" val="0"/>
@@ -5037,8 +6215,8 @@
         </p:blipFill>
         <p:spPr bwMode="auto">
           <a:xfrm>
-            <a:off x="168165" y="3815272"/>
-            <a:ext cx="2743200" cy="2743200"/>
+            <a:off x="925997" y="1364786"/>
+            <a:ext cx="1675397" cy="1933687"/>
           </a:xfrm>
           <a:prstGeom prst="rect">
             <a:avLst/>
@@ -5055,10 +6233,866 @@
           </a:extLst>
         </p:spPr>
       </p:pic>
+      <p:sp>
+        <p:nvSpPr>
+          <p:cNvPr id="5" name="TextBox 4">
+            <a:extLst>
+              <a:ext uri="{FF2B5EF4-FFF2-40B4-BE49-F238E27FC236}">
+                <a16:creationId xmlns:a16="http://schemas.microsoft.com/office/drawing/2014/main" id="{45D958CD-E7CF-8476-5D46-DD1E1B732EC2}"/>
+              </a:ext>
+            </a:extLst>
+          </p:cNvPr>
+          <p:cNvSpPr txBox="1"/>
+          <p:nvPr/>
+        </p:nvSpPr>
+        <p:spPr>
+          <a:xfrm>
+            <a:off x="2840343" y="1618306"/>
+            <a:ext cx="504188" cy="1446550"/>
+          </a:xfrm>
+          <a:prstGeom prst="rect">
+            <a:avLst/>
+          </a:prstGeom>
+          <a:noFill/>
+        </p:spPr>
+        <p:txBody>
+          <a:bodyPr wrap="square" rtlCol="0">
+            <a:spAutoFit/>
+          </a:bodyPr>
+          <a:lstStyle/>
+          <a:p>
+            <a:r>
+              <a:rPr lang="en-US" sz="8800" dirty="0">
+                <a:latin typeface="Fira Sans Condensed Medium" panose="020B0603050000020004" pitchFamily="34" charset="0"/>
+              </a:rPr>
+              <a:t>+</a:t>
+            </a:r>
+          </a:p>
+        </p:txBody>
+      </p:sp>
+      <p:sp>
+        <p:nvSpPr>
+          <p:cNvPr id="6" name="TextBox 5">
+            <a:extLst>
+              <a:ext uri="{FF2B5EF4-FFF2-40B4-BE49-F238E27FC236}">
+                <a16:creationId xmlns:a16="http://schemas.microsoft.com/office/drawing/2014/main" id="{07727F68-CC7C-2272-1902-BF775310FC66}"/>
+              </a:ext>
+            </a:extLst>
+          </p:cNvPr>
+          <p:cNvSpPr txBox="1"/>
+          <p:nvPr/>
+        </p:nvSpPr>
+        <p:spPr>
+          <a:xfrm>
+            <a:off x="6195807" y="3071485"/>
+            <a:ext cx="705642" cy="1446550"/>
+          </a:xfrm>
+          <a:prstGeom prst="rect">
+            <a:avLst/>
+          </a:prstGeom>
+          <a:noFill/>
+        </p:spPr>
+        <p:txBody>
+          <a:bodyPr wrap="none" rtlCol="0">
+            <a:spAutoFit/>
+          </a:bodyPr>
+          <a:lstStyle/>
+          <a:p>
+            <a:r>
+              <a:rPr lang="en-US" sz="8800" dirty="0">
+                <a:latin typeface="Fira Sans Condensed Medium" panose="020B0603050000020004" pitchFamily="34" charset="0"/>
+              </a:rPr>
+              <a:t>=</a:t>
+            </a:r>
+          </a:p>
+        </p:txBody>
+      </p:sp>
+      <p:sp>
+        <p:nvSpPr>
+          <p:cNvPr id="2" name="Rounded Rectangle 1">
+            <a:extLst>
+              <a:ext uri="{FF2B5EF4-FFF2-40B4-BE49-F238E27FC236}">
+                <a16:creationId xmlns:a16="http://schemas.microsoft.com/office/drawing/2014/main" id="{FB521354-026B-F292-B356-C0B62F998E76}"/>
+              </a:ext>
+            </a:extLst>
+          </p:cNvPr>
+          <p:cNvSpPr/>
+          <p:nvPr/>
+        </p:nvSpPr>
+        <p:spPr>
+          <a:xfrm>
+            <a:off x="304799" y="450929"/>
+            <a:ext cx="5791201" cy="5956142"/>
+          </a:xfrm>
+          <a:prstGeom prst="roundRect">
+            <a:avLst>
+              <a:gd name="adj" fmla="val 7170"/>
+            </a:avLst>
+          </a:prstGeom>
+          <a:noFill/>
+          <a:ln w="38100">
+            <a:solidFill>
+              <a:srgbClr val="FF0000"/>
+            </a:solidFill>
+          </a:ln>
+        </p:spPr>
+        <p:style>
+          <a:lnRef idx="2">
+            <a:schemeClr val="accent1">
+              <a:shade val="15000"/>
+            </a:schemeClr>
+          </a:lnRef>
+          <a:fillRef idx="1">
+            <a:schemeClr val="accent1"/>
+          </a:fillRef>
+          <a:effectRef idx="0">
+            <a:schemeClr val="accent1"/>
+          </a:effectRef>
+          <a:fontRef idx="minor">
+            <a:schemeClr val="lt1"/>
+          </a:fontRef>
+        </p:style>
+        <p:txBody>
+          <a:bodyPr rtlCol="0" anchor="t"/>
+          <a:lstStyle/>
+          <a:p>
+            <a:pPr algn="ctr"/>
+            <a:r>
+              <a:rPr lang="en-US" sz="2200" dirty="0">
+                <a:solidFill>
+                  <a:srgbClr val="FF0000"/>
+                </a:solidFill>
+                <a:latin typeface="Fira Sans Condensed Medium" panose="020B0603050000020004" pitchFamily="34" charset="0"/>
+                <a:ea typeface="Roboto" panose="02000000000000000000" pitchFamily="2" charset="0"/>
+              </a:rPr>
+              <a:t>Shiny App</a:t>
+            </a:r>
+          </a:p>
+        </p:txBody>
+      </p:sp>
+      <p:sp>
+        <p:nvSpPr>
+          <p:cNvPr id="10" name="Rounded Rectangle 9">
+            <a:extLst>
+              <a:ext uri="{FF2B5EF4-FFF2-40B4-BE49-F238E27FC236}">
+                <a16:creationId xmlns:a16="http://schemas.microsoft.com/office/drawing/2014/main" id="{D82461BA-1D89-58B3-F299-47D567AC9AFC}"/>
+              </a:ext>
+            </a:extLst>
+          </p:cNvPr>
+          <p:cNvSpPr/>
+          <p:nvPr/>
+        </p:nvSpPr>
+        <p:spPr>
+          <a:xfrm>
+            <a:off x="623988" y="1198581"/>
+            <a:ext cx="5152822" cy="2286000"/>
+          </a:xfrm>
+          <a:prstGeom prst="roundRect">
+            <a:avLst>
+              <a:gd name="adj" fmla="val 7170"/>
+            </a:avLst>
+          </a:prstGeom>
+          <a:noFill/>
+          <a:ln w="38100">
+            <a:solidFill>
+              <a:schemeClr val="accent3">
+                <a:lumMod val="60000"/>
+                <a:lumOff val="40000"/>
+              </a:schemeClr>
+            </a:solidFill>
+          </a:ln>
+        </p:spPr>
+        <p:style>
+          <a:lnRef idx="2">
+            <a:schemeClr val="accent1">
+              <a:shade val="15000"/>
+            </a:schemeClr>
+          </a:lnRef>
+          <a:fillRef idx="1">
+            <a:schemeClr val="accent1"/>
+          </a:fillRef>
+          <a:effectRef idx="0">
+            <a:schemeClr val="accent1"/>
+          </a:effectRef>
+          <a:fontRef idx="minor">
+            <a:schemeClr val="lt1"/>
+          </a:fontRef>
+        </p:style>
+        <p:txBody>
+          <a:bodyPr rtlCol="0" anchor="t"/>
+          <a:lstStyle/>
+          <a:p>
+            <a:pPr algn="ctr"/>
+            <a:r>
+              <a:rPr lang="en-US" sz="2200" dirty="0">
+                <a:solidFill>
+                  <a:schemeClr val="accent3">
+                    <a:lumMod val="60000"/>
+                    <a:lumOff val="40000"/>
+                  </a:schemeClr>
+                </a:solidFill>
+                <a:latin typeface="Fira Sans Condensed Medium" panose="020B0603050000020004" pitchFamily="34" charset="0"/>
+                <a:ea typeface="Roboto" panose="02000000000000000000" pitchFamily="2" charset="0"/>
+              </a:rPr>
+              <a:t>UI</a:t>
+            </a:r>
+          </a:p>
+        </p:txBody>
+      </p:sp>
+      <p:sp>
+        <p:nvSpPr>
+          <p:cNvPr id="11" name="Rounded Rectangle 10">
+            <a:extLst>
+              <a:ext uri="{FF2B5EF4-FFF2-40B4-BE49-F238E27FC236}">
+                <a16:creationId xmlns:a16="http://schemas.microsoft.com/office/drawing/2014/main" id="{40052733-5A8A-847F-7A2A-78BB70004BC4}"/>
+              </a:ext>
+            </a:extLst>
+          </p:cNvPr>
+          <p:cNvSpPr/>
+          <p:nvPr/>
+        </p:nvSpPr>
+        <p:spPr>
+          <a:xfrm>
+            <a:off x="623988" y="3804210"/>
+            <a:ext cx="5152822" cy="2286000"/>
+          </a:xfrm>
+          <a:prstGeom prst="roundRect">
+            <a:avLst>
+              <a:gd name="adj" fmla="val 7170"/>
+            </a:avLst>
+          </a:prstGeom>
+          <a:noFill/>
+          <a:ln w="38100">
+            <a:solidFill>
+              <a:schemeClr val="accent1">
+                <a:lumMod val="60000"/>
+                <a:lumOff val="40000"/>
+              </a:schemeClr>
+            </a:solidFill>
+          </a:ln>
+        </p:spPr>
+        <p:style>
+          <a:lnRef idx="2">
+            <a:schemeClr val="accent1">
+              <a:shade val="15000"/>
+            </a:schemeClr>
+          </a:lnRef>
+          <a:fillRef idx="1">
+            <a:schemeClr val="accent1"/>
+          </a:fillRef>
+          <a:effectRef idx="0">
+            <a:schemeClr val="accent1"/>
+          </a:effectRef>
+          <a:fontRef idx="minor">
+            <a:schemeClr val="lt1"/>
+          </a:fontRef>
+        </p:style>
+        <p:txBody>
+          <a:bodyPr rtlCol="0" anchor="t"/>
+          <a:lstStyle/>
+          <a:p>
+            <a:pPr algn="ctr"/>
+            <a:r>
+              <a:rPr lang="en-US" sz="2200" dirty="0">
+                <a:solidFill>
+                  <a:schemeClr val="accent1">
+                    <a:lumMod val="60000"/>
+                    <a:lumOff val="40000"/>
+                  </a:schemeClr>
+                </a:solidFill>
+                <a:latin typeface="Fira Sans Condensed Medium" panose="020B0603050000020004" pitchFamily="34" charset="0"/>
+                <a:ea typeface="Roboto" panose="02000000000000000000" pitchFamily="2" charset="0"/>
+              </a:rPr>
+              <a:t>Server</a:t>
+            </a:r>
+          </a:p>
+        </p:txBody>
+      </p:sp>
+      <p:pic>
+        <p:nvPicPr>
+          <p:cNvPr id="12" name="Picture 11" descr="A hexagon with a sign and a arrow&#10;&#10;Description automatically generated">
+            <a:extLst>
+              <a:ext uri="{FF2B5EF4-FFF2-40B4-BE49-F238E27FC236}">
+                <a16:creationId xmlns:a16="http://schemas.microsoft.com/office/drawing/2014/main" id="{4C066B4D-4BB2-1C00-0093-0C0166E921DA}"/>
+              </a:ext>
+            </a:extLst>
+          </p:cNvPr>
+          <p:cNvPicPr>
+            <a:picLocks noChangeAspect="1"/>
+          </p:cNvPicPr>
+          <p:nvPr/>
+        </p:nvPicPr>
+        <p:blipFill>
+          <a:blip r:embed="rId4"/>
+          <a:stretch>
+            <a:fillRect/>
+          </a:stretch>
+        </p:blipFill>
+        <p:spPr>
+          <a:xfrm>
+            <a:off x="3720160" y="3980366"/>
+            <a:ext cx="1681019" cy="1933687"/>
+          </a:xfrm>
+          <a:prstGeom prst="rect">
+            <a:avLst/>
+          </a:prstGeom>
+        </p:spPr>
+      </p:pic>
+      <p:pic>
+        <p:nvPicPr>
+          <p:cNvPr id="14" name="Picture 13" descr="A blue hexagon with white text&#10;&#10;Description automatically generated">
+            <a:extLst>
+              <a:ext uri="{FF2B5EF4-FFF2-40B4-BE49-F238E27FC236}">
+                <a16:creationId xmlns:a16="http://schemas.microsoft.com/office/drawing/2014/main" id="{657DD70C-2907-E108-7380-F0A15E2ACD6F}"/>
+              </a:ext>
+            </a:extLst>
+          </p:cNvPr>
+          <p:cNvPicPr>
+            <a:picLocks noChangeAspect="1"/>
+          </p:cNvPicPr>
+          <p:nvPr/>
+        </p:nvPicPr>
+        <p:blipFill>
+          <a:blip r:embed="rId6"/>
+          <a:stretch>
+            <a:fillRect/>
+          </a:stretch>
+        </p:blipFill>
+        <p:spPr>
+          <a:xfrm>
+            <a:off x="929073" y="3980366"/>
+            <a:ext cx="1672321" cy="1938528"/>
+          </a:xfrm>
+          <a:prstGeom prst="rect">
+            <a:avLst/>
+          </a:prstGeom>
+        </p:spPr>
+      </p:pic>
+      <p:sp>
+        <p:nvSpPr>
+          <p:cNvPr id="15" name="TextBox 14">
+            <a:extLst>
+              <a:ext uri="{FF2B5EF4-FFF2-40B4-BE49-F238E27FC236}">
+                <a16:creationId xmlns:a16="http://schemas.microsoft.com/office/drawing/2014/main" id="{C895A0D9-2302-7304-3D0B-CCDB95C10242}"/>
+              </a:ext>
+            </a:extLst>
+          </p:cNvPr>
+          <p:cNvSpPr txBox="1"/>
+          <p:nvPr/>
+        </p:nvSpPr>
+        <p:spPr>
+          <a:xfrm>
+            <a:off x="2812612" y="4232233"/>
+            <a:ext cx="504188" cy="1446550"/>
+          </a:xfrm>
+          <a:prstGeom prst="rect">
+            <a:avLst/>
+          </a:prstGeom>
+          <a:noFill/>
+        </p:spPr>
+        <p:txBody>
+          <a:bodyPr wrap="square" rtlCol="0">
+            <a:spAutoFit/>
+          </a:bodyPr>
+          <a:lstStyle/>
+          <a:p>
+            <a:r>
+              <a:rPr lang="en-US" sz="8800" dirty="0">
+                <a:latin typeface="Fira Sans Condensed Medium" panose="020B0603050000020004" pitchFamily="34" charset="0"/>
+              </a:rPr>
+              <a:t>+</a:t>
+            </a:r>
+          </a:p>
+        </p:txBody>
+      </p:sp>
     </p:spTree>
     <p:extLst>
       <p:ext uri="{BB962C8B-B14F-4D97-AF65-F5344CB8AC3E}">
-        <p14:creationId xmlns:p14="http://schemas.microsoft.com/office/powerpoint/2010/main" val="2850970145"/>
+        <p14:creationId xmlns:p14="http://schemas.microsoft.com/office/powerpoint/2010/main" val="3579784992"/>
+      </p:ext>
+    </p:extLst>
+  </p:cSld>
+  <p:clrMapOvr>
+    <a:masterClrMapping/>
+  </p:clrMapOvr>
+</p:sld>
+</file>
+
+<file path=ppt/slides/slide14.xml><?xml version="1.0" encoding="utf-8"?>
+<p:sld xmlns:a="http://schemas.openxmlformats.org/drawingml/2006/main" xmlns:r="http://schemas.openxmlformats.org/officeDocument/2006/relationships" xmlns:p="http://schemas.openxmlformats.org/presentationml/2006/main">
+  <p:cSld>
+    <p:bg>
+      <p:bgPr>
+        <a:solidFill>
+          <a:srgbClr val="EAEAEB"/>
+        </a:solidFill>
+        <a:effectLst/>
+      </p:bgPr>
+    </p:bg>
+    <p:spTree>
+      <p:nvGrpSpPr>
+        <p:cNvPr id="1" name="">
+          <a:extLst>
+            <a:ext uri="{FF2B5EF4-FFF2-40B4-BE49-F238E27FC236}">
+              <a16:creationId xmlns:a16="http://schemas.microsoft.com/office/drawing/2014/main" id="{F44ABA3B-B34B-AC7C-DC58-2DBE6EE0B61E}"/>
+            </a:ext>
+          </a:extLst>
+        </p:cNvPr>
+        <p:cNvGrpSpPr/>
+        <p:nvPr/>
+      </p:nvGrpSpPr>
+      <p:grpSpPr>
+        <a:xfrm>
+          <a:off x="0" y="0"/>
+          <a:ext cx="0" cy="0"/>
+          <a:chOff x="0" y="0"/>
+          <a:chExt cx="0" cy="0"/>
+        </a:xfrm>
+      </p:grpSpPr>
+      <p:pic>
+        <p:nvPicPr>
+          <p:cNvPr id="8" name="Picture 7" descr="A screenshot of a computer&#10;&#10;Description automatically generated">
+            <a:extLst>
+              <a:ext uri="{FF2B5EF4-FFF2-40B4-BE49-F238E27FC236}">
+                <a16:creationId xmlns:a16="http://schemas.microsoft.com/office/drawing/2014/main" id="{A6872ADC-FD48-F8C1-3C7A-9892BF44ABC0}"/>
+              </a:ext>
+            </a:extLst>
+          </p:cNvPr>
+          <p:cNvPicPr>
+            <a:picLocks noChangeAspect="1"/>
+          </p:cNvPicPr>
+          <p:nvPr/>
+        </p:nvPicPr>
+        <p:blipFill>
+          <a:blip r:embed="rId3"/>
+          <a:stretch>
+            <a:fillRect/>
+          </a:stretch>
+        </p:blipFill>
+        <p:spPr>
+          <a:xfrm>
+            <a:off x="6882083" y="955146"/>
+            <a:ext cx="5291667" cy="4947708"/>
+          </a:xfrm>
+          <a:prstGeom prst="rect">
+            <a:avLst/>
+          </a:prstGeom>
+          <a:solidFill>
+            <a:srgbClr val="EAEAEB">
+              <a:alpha val="99000"/>
+            </a:srgbClr>
+          </a:solidFill>
+        </p:spPr>
+      </p:pic>
+      <p:grpSp>
+        <p:nvGrpSpPr>
+          <p:cNvPr id="2" name="Group 1">
+            <a:extLst>
+              <a:ext uri="{FF2B5EF4-FFF2-40B4-BE49-F238E27FC236}">
+                <a16:creationId xmlns:a16="http://schemas.microsoft.com/office/drawing/2014/main" id="{4109CDF5-A2CA-88C8-D167-245DC06C894A}"/>
+              </a:ext>
+            </a:extLst>
+          </p:cNvPr>
+          <p:cNvGrpSpPr/>
+          <p:nvPr/>
+        </p:nvGrpSpPr>
+        <p:grpSpPr>
+          <a:xfrm>
+            <a:off x="604126" y="91827"/>
+            <a:ext cx="4138739" cy="6674346"/>
+            <a:chOff x="233564" y="285582"/>
+            <a:chExt cx="4138739" cy="6674346"/>
+          </a:xfrm>
+          <a:effectLst>
+            <a:outerShdw blurRad="317500" dist="38100" dir="2700000" sx="102000" sy="102000" algn="tl" rotWithShape="0">
+              <a:prstClr val="black">
+                <a:alpha val="40000"/>
+              </a:prstClr>
+            </a:outerShdw>
+          </a:effectLst>
+        </p:grpSpPr>
+        <p:sp>
+          <p:nvSpPr>
+            <p:cNvPr id="15" name="TextBox 14">
+              <a:extLst>
+                <a:ext uri="{FF2B5EF4-FFF2-40B4-BE49-F238E27FC236}">
+                  <a16:creationId xmlns:a16="http://schemas.microsoft.com/office/drawing/2014/main" id="{55E42451-4717-88FC-975F-A126B907A2AD}"/>
+                </a:ext>
+              </a:extLst>
+            </p:cNvPr>
+            <p:cNvSpPr txBox="1"/>
+            <p:nvPr/>
+          </p:nvSpPr>
+          <p:spPr>
+            <a:xfrm>
+              <a:off x="233564" y="285582"/>
+              <a:ext cx="4138739" cy="732115"/>
+            </a:xfrm>
+            <a:prstGeom prst="roundRect">
+              <a:avLst/>
+            </a:prstGeom>
+            <a:solidFill>
+              <a:schemeClr val="tx1">
+                <a:lumMod val="75000"/>
+                <a:lumOff val="25000"/>
+              </a:schemeClr>
+            </a:solidFill>
+            <a:ln>
+              <a:solidFill>
+                <a:schemeClr val="tx1">
+                  <a:lumMod val="75000"/>
+                  <a:lumOff val="25000"/>
+                </a:schemeClr>
+              </a:solidFill>
+            </a:ln>
+          </p:spPr>
+          <p:txBody>
+            <a:bodyPr wrap="square" tIns="0" rtlCol="0">
+              <a:spAutoFit/>
+            </a:bodyPr>
+            <a:lstStyle/>
+            <a:p>
+              <a:pPr algn="r"/>
+              <a:r>
+                <a:rPr lang="en-US" sz="2000" dirty="0" err="1">
+                  <a:solidFill>
+                    <a:schemeClr val="bg1"/>
+                  </a:solidFill>
+                  <a:latin typeface="Fira Sans Condensed Medium" panose="020B0603050000020004" pitchFamily="34" charset="0"/>
+                </a:rPr>
+                <a:t>survey.qmd</a:t>
+              </a:r>
+              <a:endParaRPr lang="en-US" sz="2000" dirty="0">
+                <a:solidFill>
+                  <a:schemeClr val="bg1"/>
+                </a:solidFill>
+                <a:latin typeface="Fira Sans Condensed Medium" panose="020B0603050000020004" pitchFamily="34" charset="0"/>
+              </a:endParaRPr>
+            </a:p>
+            <a:p>
+              <a:pPr algn="r"/>
+              <a:endParaRPr lang="en-US" sz="2000" dirty="0">
+                <a:solidFill>
+                  <a:schemeClr val="bg1"/>
+                </a:solidFill>
+                <a:latin typeface="Fira Sans Condensed Medium" panose="020B0603050000020004" pitchFamily="34" charset="0"/>
+              </a:endParaRPr>
+            </a:p>
+          </p:txBody>
+        </p:sp>
+        <p:sp>
+          <p:nvSpPr>
+            <p:cNvPr id="14" name="TextBox 13">
+              <a:extLst>
+                <a:ext uri="{FF2B5EF4-FFF2-40B4-BE49-F238E27FC236}">
+                  <a16:creationId xmlns:a16="http://schemas.microsoft.com/office/drawing/2014/main" id="{24A128A2-5242-55F6-3CFF-D4147CD390D0}"/>
+                </a:ext>
+              </a:extLst>
+            </p:cNvPr>
+            <p:cNvSpPr txBox="1"/>
+            <p:nvPr/>
+          </p:nvSpPr>
+          <p:spPr>
+            <a:xfrm>
+              <a:off x="233565" y="651640"/>
+              <a:ext cx="4138738" cy="6308288"/>
+            </a:xfrm>
+            <a:prstGeom prst="roundRect">
+              <a:avLst>
+                <a:gd name="adj" fmla="val 2772"/>
+              </a:avLst>
+            </a:prstGeom>
+            <a:solidFill>
+              <a:schemeClr val="bg1"/>
+            </a:solidFill>
+            <a:ln>
+              <a:solidFill>
+                <a:schemeClr val="tx1"/>
+              </a:solidFill>
+            </a:ln>
+            <a:effectLst/>
+          </p:spPr>
+          <p:txBody>
+            <a:bodyPr wrap="square" rtlCol="0">
+              <a:spAutoFit/>
+            </a:bodyPr>
+            <a:lstStyle/>
+            <a:p>
+              <a:r>
+                <a:rPr lang="en-US" sz="1600" dirty="0">
+                  <a:latin typeface="Monaco" pitchFamily="2" charset="77"/>
+                </a:rPr>
+                <a:t>---</a:t>
+              </a:r>
+            </a:p>
+            <a:p>
+              <a:r>
+                <a:rPr lang="en-US" sz="1600" dirty="0">
+                  <a:latin typeface="Monaco" pitchFamily="2" charset="77"/>
+                </a:rPr>
+                <a:t>format: html</a:t>
+              </a:r>
+            </a:p>
+            <a:p>
+              <a:r>
+                <a:rPr lang="en-US" sz="1600" dirty="0">
+                  <a:latin typeface="Monaco" pitchFamily="2" charset="77"/>
+                </a:rPr>
+                <a:t>echo: false</a:t>
+              </a:r>
+            </a:p>
+            <a:p>
+              <a:r>
+                <a:rPr lang="en-US" sz="1600" dirty="0">
+                  <a:latin typeface="Monaco" pitchFamily="2" charset="77"/>
+                </a:rPr>
+                <a:t>warning: false</a:t>
+              </a:r>
+            </a:p>
+            <a:p>
+              <a:r>
+                <a:rPr lang="en-US" sz="1600" dirty="0">
+                  <a:latin typeface="Monaco" pitchFamily="2" charset="77"/>
+                </a:rPr>
+                <a:t>---</a:t>
+              </a:r>
+            </a:p>
+            <a:p>
+              <a:endParaRPr lang="en-US" sz="1600" dirty="0">
+                <a:latin typeface="Monaco" pitchFamily="2" charset="77"/>
+              </a:endParaRPr>
+            </a:p>
+            <a:p>
+              <a:r>
+                <a:rPr lang="en-US" sz="1600" dirty="0">
+                  <a:latin typeface="Monaco" pitchFamily="2" charset="77"/>
+                </a:rPr>
+                <a:t>```{r}</a:t>
+              </a:r>
+            </a:p>
+            <a:p>
+              <a:r>
+                <a:rPr lang="en-US" sz="1600" dirty="0">
+                  <a:latin typeface="Monaco" pitchFamily="2" charset="77"/>
+                </a:rPr>
+                <a:t>library(</a:t>
+              </a:r>
+              <a:r>
+                <a:rPr lang="en-US" sz="1600" dirty="0" err="1">
+                  <a:latin typeface="Monaco" pitchFamily="2" charset="77"/>
+                </a:rPr>
+                <a:t>surveydown</a:t>
+              </a:r>
+              <a:r>
+                <a:rPr lang="en-US" sz="1600" dirty="0">
+                  <a:latin typeface="Monaco" pitchFamily="2" charset="77"/>
+                </a:rPr>
+                <a:t>)</a:t>
+              </a:r>
+            </a:p>
+            <a:p>
+              <a:r>
+                <a:rPr lang="en-US" sz="1600" dirty="0">
+                  <a:latin typeface="Monaco" pitchFamily="2" charset="77"/>
+                </a:rPr>
+                <a:t>```</a:t>
+              </a:r>
+            </a:p>
+            <a:p>
+              <a:endParaRPr lang="en-US" sz="1600" dirty="0">
+                <a:latin typeface="Monaco" pitchFamily="2" charset="77"/>
+              </a:endParaRPr>
+            </a:p>
+            <a:p>
+              <a:r>
+                <a:rPr lang="en-US" sz="1600" dirty="0">
+                  <a:latin typeface="Monaco" pitchFamily="2" charset="77"/>
+                </a:rPr>
+                <a:t>::: {.</a:t>
+              </a:r>
+              <a:r>
+                <a:rPr lang="en-US" sz="1600" dirty="0" err="1">
+                  <a:latin typeface="Monaco" pitchFamily="2" charset="77"/>
+                </a:rPr>
+                <a:t>sd_page</a:t>
+              </a:r>
+              <a:r>
+                <a:rPr lang="en-US" sz="1600" dirty="0">
+                  <a:latin typeface="Monaco" pitchFamily="2" charset="77"/>
+                </a:rPr>
+                <a:t> id=welcome}</a:t>
+              </a:r>
+            </a:p>
+            <a:p>
+              <a:endParaRPr lang="en-US" sz="1600" dirty="0">
+                <a:latin typeface="Monaco" pitchFamily="2" charset="77"/>
+              </a:endParaRPr>
+            </a:p>
+            <a:p>
+              <a:r>
+                <a:rPr lang="en-US" sz="1600" dirty="0">
+                  <a:latin typeface="Monaco" pitchFamily="2" charset="77"/>
+                </a:rPr>
+                <a:t># Welcome to our survey!</a:t>
+              </a:r>
+            </a:p>
+            <a:p>
+              <a:endParaRPr lang="en-US" sz="1600" dirty="0">
+                <a:latin typeface="Monaco" pitchFamily="2" charset="77"/>
+              </a:endParaRPr>
+            </a:p>
+            <a:p>
+              <a:r>
+                <a:rPr lang="en-US" sz="1600" dirty="0">
+                  <a:latin typeface="Monaco" pitchFamily="2" charset="77"/>
+                </a:rPr>
+                <a:t>```{r}</a:t>
+              </a:r>
+            </a:p>
+            <a:p>
+              <a:r>
+                <a:rPr lang="en-US" sz="1600" dirty="0" err="1">
+                  <a:latin typeface="Monaco" pitchFamily="2" charset="77"/>
+                </a:rPr>
+                <a:t>sd_question</a:t>
+              </a:r>
+              <a:r>
+                <a:rPr lang="en-US" sz="1600" dirty="0">
+                  <a:latin typeface="Monaco" pitchFamily="2" charset="77"/>
+                </a:rPr>
+                <a:t>(</a:t>
+              </a:r>
+            </a:p>
+            <a:p>
+              <a:r>
+                <a:rPr lang="en-US" sz="1600" dirty="0">
+                  <a:latin typeface="Monaco" pitchFamily="2" charset="77"/>
+                </a:rPr>
+                <a:t>  type  = "text",</a:t>
+              </a:r>
+            </a:p>
+            <a:p>
+              <a:r>
+                <a:rPr lang="en-US" sz="1600" dirty="0">
+                  <a:latin typeface="Monaco" pitchFamily="2" charset="77"/>
+                </a:rPr>
+                <a:t>  id    = "name",</a:t>
+              </a:r>
+            </a:p>
+            <a:p>
+              <a:r>
+                <a:rPr lang="en-US" sz="1600" dirty="0">
+                  <a:latin typeface="Monaco" pitchFamily="2" charset="77"/>
+                </a:rPr>
+                <a:t>  label = "What's your name?"</a:t>
+              </a:r>
+            </a:p>
+            <a:p>
+              <a:r>
+                <a:rPr lang="en-US" sz="1600" dirty="0">
+                  <a:latin typeface="Monaco" pitchFamily="2" charset="77"/>
+                </a:rPr>
+                <a:t>)</a:t>
+              </a:r>
+            </a:p>
+            <a:p>
+              <a:endParaRPr lang="en-US" sz="1600" dirty="0">
+                <a:latin typeface="Monaco" pitchFamily="2" charset="77"/>
+              </a:endParaRPr>
+            </a:p>
+            <a:p>
+              <a:r>
+                <a:rPr lang="en-US" sz="1600" dirty="0" err="1">
+                  <a:latin typeface="Monaco" pitchFamily="2" charset="77"/>
+                </a:rPr>
+                <a:t>sd_next</a:t>
+              </a:r>
+              <a:r>
+                <a:rPr lang="en-US" sz="1600" dirty="0">
+                  <a:latin typeface="Monaco" pitchFamily="2" charset="77"/>
+                </a:rPr>
+                <a:t>()</a:t>
+              </a:r>
+            </a:p>
+            <a:p>
+              <a:r>
+                <a:rPr lang="en-US" sz="1600" dirty="0">
+                  <a:latin typeface="Monaco" pitchFamily="2" charset="77"/>
+                </a:rPr>
+                <a:t>```</a:t>
+              </a:r>
+            </a:p>
+            <a:p>
+              <a:endParaRPr lang="en-US" sz="1600" dirty="0">
+                <a:latin typeface="Monaco" pitchFamily="2" charset="77"/>
+              </a:endParaRPr>
+            </a:p>
+            <a:p>
+              <a:r>
+                <a:rPr lang="en-US" sz="1600" dirty="0">
+                  <a:latin typeface="Monaco" pitchFamily="2" charset="77"/>
+                </a:rPr>
+                <a:t>:::</a:t>
+              </a:r>
+            </a:p>
+          </p:txBody>
+        </p:sp>
+      </p:grpSp>
+      <p:sp>
+        <p:nvSpPr>
+          <p:cNvPr id="16" name="Right Arrow 15">
+            <a:extLst>
+              <a:ext uri="{FF2B5EF4-FFF2-40B4-BE49-F238E27FC236}">
+                <a16:creationId xmlns:a16="http://schemas.microsoft.com/office/drawing/2014/main" id="{CD6E9ACB-610F-33F6-A8AF-ACA718C7F372}"/>
+              </a:ext>
+            </a:extLst>
+          </p:cNvPr>
+          <p:cNvSpPr/>
+          <p:nvPr/>
+        </p:nvSpPr>
+        <p:spPr>
+          <a:xfrm>
+            <a:off x="5449614" y="3097924"/>
+            <a:ext cx="1292772" cy="662152"/>
+          </a:xfrm>
+          <a:prstGeom prst="rightArrow">
+            <a:avLst/>
+          </a:prstGeom>
+          <a:solidFill>
+            <a:schemeClr val="bg1">
+              <a:lumMod val="75000"/>
+            </a:schemeClr>
+          </a:solidFill>
+        </p:spPr>
+        <p:style>
+          <a:lnRef idx="2">
+            <a:schemeClr val="accent1">
+              <a:shade val="15000"/>
+            </a:schemeClr>
+          </a:lnRef>
+          <a:fillRef idx="1">
+            <a:schemeClr val="accent1"/>
+          </a:fillRef>
+          <a:effectRef idx="0">
+            <a:schemeClr val="accent1"/>
+          </a:effectRef>
+          <a:fontRef idx="minor">
+            <a:schemeClr val="lt1"/>
+          </a:fontRef>
+        </p:style>
+        <p:txBody>
+          <a:bodyPr rtlCol="0" anchor="ctr"/>
+          <a:lstStyle/>
+          <a:p>
+            <a:pPr algn="ctr"/>
+            <a:endParaRPr lang="en-US"/>
+          </a:p>
+        </p:txBody>
+      </p:sp>
+    </p:spTree>
+    <p:extLst>
+      <p:ext uri="{BB962C8B-B14F-4D97-AF65-F5344CB8AC3E}">
+        <p14:creationId xmlns:p14="http://schemas.microsoft.com/office/powerpoint/2010/main" val="233175349"/>
       </p:ext>
     </p:extLst>
   </p:cSld>

</xml_diff>